<commit_message>
graphic interface and full calibration sequence for pilot
</commit_message>
<xml_diff>
--- a/pilot.pptx
+++ b/pilot.pptx
@@ -2,21 +2,20 @@
 <file path=ppt/presentation.xml><?xml version="1.0" encoding="utf-8"?>
 <p:presentation xmlns:a="http://schemas.openxmlformats.org/drawingml/2006/main" xmlns:r="http://schemas.openxmlformats.org/officeDocument/2006/relationships" xmlns:p="http://schemas.openxmlformats.org/presentationml/2006/main" saveSubsetFonts="1" autoCompressPictures="0">
   <p:sldMasterIdLst>
-    <p:sldMasterId id="2147483648" r:id="rId1"/>
+    <p:sldMasterId id="2147483660" r:id="rId1"/>
   </p:sldMasterIdLst>
   <p:sldIdLst>
     <p:sldId id="260" r:id="rId2"/>
-    <p:sldId id="261" r:id="rId3"/>
-    <p:sldId id="257" r:id="rId4"/>
-    <p:sldId id="258" r:id="rId5"/>
+    <p:sldId id="262" r:id="rId3"/>
+    <p:sldId id="261" r:id="rId4"/>
   </p:sldIdLst>
-  <p:sldSz cx="12192000" cy="6858000"/>
+  <p:sldSz cx="6858000" cy="12188825"/>
   <p:notesSz cx="6858000" cy="9144000"/>
   <p:defaultTextStyle>
     <a:defPPr>
       <a:defRPr lang="en-US"/>
     </a:defPPr>
-    <a:lvl1pPr marL="0" algn="l" defTabSz="914400" rtl="0" eaLnBrk="1" latinLnBrk="0" hangingPunct="1">
+    <a:lvl1pPr marL="0" algn="l" defTabSz="457200" rtl="0" eaLnBrk="1" latinLnBrk="0" hangingPunct="1">
       <a:defRPr sz="1800" kern="1200">
         <a:solidFill>
           <a:schemeClr val="tx1"/>
@@ -26,7 +25,7 @@
         <a:cs typeface="+mn-cs"/>
       </a:defRPr>
     </a:lvl1pPr>
-    <a:lvl2pPr marL="457200" algn="l" defTabSz="914400" rtl="0" eaLnBrk="1" latinLnBrk="0" hangingPunct="1">
+    <a:lvl2pPr marL="457200" algn="l" defTabSz="457200" rtl="0" eaLnBrk="1" latinLnBrk="0" hangingPunct="1">
       <a:defRPr sz="1800" kern="1200">
         <a:solidFill>
           <a:schemeClr val="tx1"/>
@@ -36,7 +35,7 @@
         <a:cs typeface="+mn-cs"/>
       </a:defRPr>
     </a:lvl2pPr>
-    <a:lvl3pPr marL="914400" algn="l" defTabSz="914400" rtl="0" eaLnBrk="1" latinLnBrk="0" hangingPunct="1">
+    <a:lvl3pPr marL="914400" algn="l" defTabSz="457200" rtl="0" eaLnBrk="1" latinLnBrk="0" hangingPunct="1">
       <a:defRPr sz="1800" kern="1200">
         <a:solidFill>
           <a:schemeClr val="tx1"/>
@@ -46,7 +45,7 @@
         <a:cs typeface="+mn-cs"/>
       </a:defRPr>
     </a:lvl3pPr>
-    <a:lvl4pPr marL="1371600" algn="l" defTabSz="914400" rtl="0" eaLnBrk="1" latinLnBrk="0" hangingPunct="1">
+    <a:lvl4pPr marL="1371600" algn="l" defTabSz="457200" rtl="0" eaLnBrk="1" latinLnBrk="0" hangingPunct="1">
       <a:defRPr sz="1800" kern="1200">
         <a:solidFill>
           <a:schemeClr val="tx1"/>
@@ -56,7 +55,7 @@
         <a:cs typeface="+mn-cs"/>
       </a:defRPr>
     </a:lvl4pPr>
-    <a:lvl5pPr marL="1828800" algn="l" defTabSz="914400" rtl="0" eaLnBrk="1" latinLnBrk="0" hangingPunct="1">
+    <a:lvl5pPr marL="1828800" algn="l" defTabSz="457200" rtl="0" eaLnBrk="1" latinLnBrk="0" hangingPunct="1">
       <a:defRPr sz="1800" kern="1200">
         <a:solidFill>
           <a:schemeClr val="tx1"/>
@@ -66,7 +65,7 @@
         <a:cs typeface="+mn-cs"/>
       </a:defRPr>
     </a:lvl5pPr>
-    <a:lvl6pPr marL="2286000" algn="l" defTabSz="914400" rtl="0" eaLnBrk="1" latinLnBrk="0" hangingPunct="1">
+    <a:lvl6pPr marL="2286000" algn="l" defTabSz="457200" rtl="0" eaLnBrk="1" latinLnBrk="0" hangingPunct="1">
       <a:defRPr sz="1800" kern="1200">
         <a:solidFill>
           <a:schemeClr val="tx1"/>
@@ -76,7 +75,7 @@
         <a:cs typeface="+mn-cs"/>
       </a:defRPr>
     </a:lvl6pPr>
-    <a:lvl7pPr marL="2743200" algn="l" defTabSz="914400" rtl="0" eaLnBrk="1" latinLnBrk="0" hangingPunct="1">
+    <a:lvl7pPr marL="2743200" algn="l" defTabSz="457200" rtl="0" eaLnBrk="1" latinLnBrk="0" hangingPunct="1">
       <a:defRPr sz="1800" kern="1200">
         <a:solidFill>
           <a:schemeClr val="tx1"/>
@@ -86,7 +85,7 @@
         <a:cs typeface="+mn-cs"/>
       </a:defRPr>
     </a:lvl7pPr>
-    <a:lvl8pPr marL="3200400" algn="l" defTabSz="914400" rtl="0" eaLnBrk="1" latinLnBrk="0" hangingPunct="1">
+    <a:lvl8pPr marL="3200400" algn="l" defTabSz="457200" rtl="0" eaLnBrk="1" latinLnBrk="0" hangingPunct="1">
       <a:defRPr sz="1800" kern="1200">
         <a:solidFill>
           <a:schemeClr val="tx1"/>
@@ -96,7 +95,7 @@
         <a:cs typeface="+mn-cs"/>
       </a:defRPr>
     </a:lvl8pPr>
-    <a:lvl9pPr marL="3657600" algn="l" defTabSz="914400" rtl="0" eaLnBrk="1" latinLnBrk="0" hangingPunct="1">
+    <a:lvl9pPr marL="3657600" algn="l" defTabSz="457200" rtl="0" eaLnBrk="1" latinLnBrk="0" hangingPunct="1">
       <a:defRPr sz="1800" kern="1200">
         <a:solidFill>
           <a:schemeClr val="tx1"/>
@@ -107,6 +106,11 @@
       </a:defRPr>
     </a:lvl9pPr>
   </p:defaultTextStyle>
+  <p:extLst>
+    <p:ext uri="{EFAFB233-063F-42B5-8137-9DF3F51BA10A}">
+      <p15:sldGuideLst xmlns:p15="http://schemas.microsoft.com/office/powerpoint/2012/main"/>
+    </p:ext>
+  </p:extLst>
 </p:presentation>
 </file>
 
@@ -129,13 +133,7 @@
       </p:grpSpPr>
       <p:sp>
         <p:nvSpPr>
-          <p:cNvPr id="2" name="Title 1">
-            <a:extLst>
-              <a:ext uri="{FF2B5EF4-FFF2-40B4-BE49-F238E27FC236}">
-                <a16:creationId xmlns:a16="http://schemas.microsoft.com/office/drawing/2014/main" id="{46D507A8-05A7-4F41-80D7-4678D520E8F8}"/>
-              </a:ext>
-            </a:extLst>
-          </p:cNvPr>
+          <p:cNvPr id="2" name="Title 1"/>
           <p:cNvSpPr>
             <a:spLocks noGrp="1"/>
           </p:cNvSpPr>
@@ -145,15 +143,15 @@
         </p:nvSpPr>
         <p:spPr>
           <a:xfrm>
-            <a:off x="1524000" y="1122363"/>
-            <a:ext cx="9144000" cy="2387600"/>
+            <a:off x="514350" y="1994792"/>
+            <a:ext cx="5829300" cy="4243517"/>
           </a:xfrm>
         </p:spPr>
         <p:txBody>
           <a:bodyPr anchor="b"/>
           <a:lstStyle>
             <a:lvl1pPr algn="ctr">
-              <a:defRPr sz="6000"/>
+              <a:defRPr sz="4500"/>
             </a:lvl1pPr>
           </a:lstStyle>
           <a:p>
@@ -161,18 +159,13 @@
               <a:rPr lang="en-US"/>
               <a:t>Click to edit Master title style</a:t>
             </a:r>
-          </a:p>
-        </p:txBody>
-      </p:sp>
-      <p:sp>
-        <p:nvSpPr>
-          <p:cNvPr id="3" name="Subtitle 2">
-            <a:extLst>
-              <a:ext uri="{FF2B5EF4-FFF2-40B4-BE49-F238E27FC236}">
-                <a16:creationId xmlns:a16="http://schemas.microsoft.com/office/drawing/2014/main" id="{ED4352AB-7EDD-E847-9933-01DCB5941A62}"/>
-              </a:ext>
-            </a:extLst>
-          </p:cNvPr>
+            <a:endParaRPr lang="en-US" dirty="0"/>
+          </a:p>
+        </p:txBody>
+      </p:sp>
+      <p:sp>
+        <p:nvSpPr>
+          <p:cNvPr id="3" name="Subtitle 2"/>
           <p:cNvSpPr>
             <a:spLocks noGrp="1"/>
           </p:cNvSpPr>
@@ -182,8 +175,8 @@
         </p:nvSpPr>
         <p:spPr>
           <a:xfrm>
-            <a:off x="1524000" y="3602038"/>
-            <a:ext cx="9144000" cy="1655762"/>
+            <a:off x="857250" y="6401956"/>
+            <a:ext cx="5143500" cy="2942810"/>
           </a:xfrm>
         </p:spPr>
         <p:txBody>
@@ -191,39 +184,39 @@
           <a:lstStyle>
             <a:lvl1pPr marL="0" indent="0" algn="ctr">
               <a:buNone/>
-              <a:defRPr sz="2400"/>
+              <a:defRPr sz="1800"/>
             </a:lvl1pPr>
-            <a:lvl2pPr marL="457200" indent="0" algn="ctr">
-              <a:buNone/>
-              <a:defRPr sz="2000"/>
+            <a:lvl2pPr marL="342900" indent="0" algn="ctr">
+              <a:buNone/>
+              <a:defRPr sz="1500"/>
             </a:lvl2pPr>
-            <a:lvl3pPr marL="914400" indent="0" algn="ctr">
-              <a:buNone/>
-              <a:defRPr sz="1800"/>
+            <a:lvl3pPr marL="685800" indent="0" algn="ctr">
+              <a:buNone/>
+              <a:defRPr sz="1350"/>
             </a:lvl3pPr>
-            <a:lvl4pPr marL="1371600" indent="0" algn="ctr">
-              <a:buNone/>
-              <a:defRPr sz="1600"/>
+            <a:lvl4pPr marL="1028700" indent="0" algn="ctr">
+              <a:buNone/>
+              <a:defRPr sz="1200"/>
             </a:lvl4pPr>
-            <a:lvl5pPr marL="1828800" indent="0" algn="ctr">
-              <a:buNone/>
-              <a:defRPr sz="1600"/>
+            <a:lvl5pPr marL="1371600" indent="0" algn="ctr">
+              <a:buNone/>
+              <a:defRPr sz="1200"/>
             </a:lvl5pPr>
-            <a:lvl6pPr marL="2286000" indent="0" algn="ctr">
-              <a:buNone/>
-              <a:defRPr sz="1600"/>
+            <a:lvl6pPr marL="1714500" indent="0" algn="ctr">
+              <a:buNone/>
+              <a:defRPr sz="1200"/>
             </a:lvl6pPr>
-            <a:lvl7pPr marL="2743200" indent="0" algn="ctr">
-              <a:buNone/>
-              <a:defRPr sz="1600"/>
+            <a:lvl7pPr marL="2057400" indent="0" algn="ctr">
+              <a:buNone/>
+              <a:defRPr sz="1200"/>
             </a:lvl7pPr>
-            <a:lvl8pPr marL="3200400" indent="0" algn="ctr">
-              <a:buNone/>
-              <a:defRPr sz="1600"/>
+            <a:lvl8pPr marL="2400300" indent="0" algn="ctr">
+              <a:buNone/>
+              <a:defRPr sz="1200"/>
             </a:lvl8pPr>
-            <a:lvl9pPr marL="3657600" indent="0" algn="ctr">
-              <a:buNone/>
-              <a:defRPr sz="1600"/>
+            <a:lvl9pPr marL="2743200" indent="0" algn="ctr">
+              <a:buNone/>
+              <a:defRPr sz="1200"/>
             </a:lvl9pPr>
           </a:lstStyle>
           <a:p>
@@ -231,18 +224,13 @@
               <a:rPr lang="en-US"/>
               <a:t>Click to edit Master subtitle style</a:t>
             </a:r>
-          </a:p>
-        </p:txBody>
-      </p:sp>
-      <p:sp>
-        <p:nvSpPr>
-          <p:cNvPr id="4" name="Date Placeholder 3">
-            <a:extLst>
-              <a:ext uri="{FF2B5EF4-FFF2-40B4-BE49-F238E27FC236}">
-                <a16:creationId xmlns:a16="http://schemas.microsoft.com/office/drawing/2014/main" id="{1B09FD36-D2AD-F048-A7E3-70FBD5F5DC61}"/>
-              </a:ext>
-            </a:extLst>
-          </p:cNvPr>
+            <a:endParaRPr lang="en-US" dirty="0"/>
+          </a:p>
+        </p:txBody>
+      </p:sp>
+      <p:sp>
+        <p:nvSpPr>
+          <p:cNvPr id="4" name="Date Placeholder 3"/>
           <p:cNvSpPr>
             <a:spLocks noGrp="1"/>
           </p:cNvSpPr>
@@ -257,7 +245,7 @@
           <a:p>
             <a:fld id="{F5C1E949-2315-8048-B2B3-E5DC19E4BEBE}" type="datetimeFigureOut">
               <a:rPr lang="en-US" smtClean="0"/>
-              <a:t>4/11/22</a:t>
+              <a:t>4/20/22</a:t>
             </a:fld>
             <a:endParaRPr lang="en-US"/>
           </a:p>
@@ -265,13 +253,7 @@
       </p:sp>
       <p:sp>
         <p:nvSpPr>
-          <p:cNvPr id="5" name="Footer Placeholder 4">
-            <a:extLst>
-              <a:ext uri="{FF2B5EF4-FFF2-40B4-BE49-F238E27FC236}">
-                <a16:creationId xmlns:a16="http://schemas.microsoft.com/office/drawing/2014/main" id="{8F1BC02A-8F4A-DC4A-B8EA-70B5A0337A9D}"/>
-              </a:ext>
-            </a:extLst>
-          </p:cNvPr>
+          <p:cNvPr id="5" name="Footer Placeholder 4"/>
           <p:cNvSpPr>
             <a:spLocks noGrp="1"/>
           </p:cNvSpPr>
@@ -290,13 +272,7 @@
       </p:sp>
       <p:sp>
         <p:nvSpPr>
-          <p:cNvPr id="6" name="Slide Number Placeholder 5">
-            <a:extLst>
-              <a:ext uri="{FF2B5EF4-FFF2-40B4-BE49-F238E27FC236}">
-                <a16:creationId xmlns:a16="http://schemas.microsoft.com/office/drawing/2014/main" id="{30C3EE23-A707-854F-8965-7C873E473F6D}"/>
-              </a:ext>
-            </a:extLst>
-          </p:cNvPr>
+          <p:cNvPr id="6" name="Slide Number Placeholder 5"/>
           <p:cNvSpPr>
             <a:spLocks noGrp="1"/>
           </p:cNvSpPr>
@@ -320,7 +296,7 @@
     </p:spTree>
     <p:extLst>
       <p:ext uri="{BB962C8B-B14F-4D97-AF65-F5344CB8AC3E}">
-        <p14:creationId xmlns:p14="http://schemas.microsoft.com/office/powerpoint/2010/main" val="158349216"/>
+        <p14:creationId xmlns:p14="http://schemas.microsoft.com/office/powerpoint/2010/main" val="3449007865"/>
       </p:ext>
     </p:extLst>
   </p:cSld>
@@ -349,13 +325,7 @@
       </p:grpSpPr>
       <p:sp>
         <p:nvSpPr>
-          <p:cNvPr id="2" name="Title 1">
-            <a:extLst>
-              <a:ext uri="{FF2B5EF4-FFF2-40B4-BE49-F238E27FC236}">
-                <a16:creationId xmlns:a16="http://schemas.microsoft.com/office/drawing/2014/main" id="{97759C80-6FF2-AE42-9D3B-BF1B5DE7D54D}"/>
-              </a:ext>
-            </a:extLst>
-          </p:cNvPr>
+          <p:cNvPr id="2" name="Title 1"/>
           <p:cNvSpPr>
             <a:spLocks noGrp="1"/>
           </p:cNvSpPr>
@@ -372,18 +342,13 @@
               <a:rPr lang="en-US"/>
               <a:t>Click to edit Master title style</a:t>
             </a:r>
-          </a:p>
-        </p:txBody>
-      </p:sp>
-      <p:sp>
-        <p:nvSpPr>
-          <p:cNvPr id="3" name="Vertical Text Placeholder 2">
-            <a:extLst>
-              <a:ext uri="{FF2B5EF4-FFF2-40B4-BE49-F238E27FC236}">
-                <a16:creationId xmlns:a16="http://schemas.microsoft.com/office/drawing/2014/main" id="{04D0AF63-173E-DB4C-AA55-BF0B51014CC6}"/>
-              </a:ext>
-            </a:extLst>
-          </p:cNvPr>
+            <a:endParaRPr lang="en-US" dirty="0"/>
+          </a:p>
+        </p:txBody>
+      </p:sp>
+      <p:sp>
+        <p:nvSpPr>
+          <p:cNvPr id="3" name="Vertical Text Placeholder 2"/>
           <p:cNvSpPr>
             <a:spLocks noGrp="1"/>
           </p:cNvSpPr>
@@ -429,18 +394,13 @@
               <a:rPr lang="en-US"/>
               <a:t>Fifth level</a:t>
             </a:r>
-          </a:p>
-        </p:txBody>
-      </p:sp>
-      <p:sp>
-        <p:nvSpPr>
-          <p:cNvPr id="4" name="Date Placeholder 3">
-            <a:extLst>
-              <a:ext uri="{FF2B5EF4-FFF2-40B4-BE49-F238E27FC236}">
-                <a16:creationId xmlns:a16="http://schemas.microsoft.com/office/drawing/2014/main" id="{B32D7DD0-FE55-CA4D-B2E2-9AA8FA375A2A}"/>
-              </a:ext>
-            </a:extLst>
-          </p:cNvPr>
+            <a:endParaRPr lang="en-US" dirty="0"/>
+          </a:p>
+        </p:txBody>
+      </p:sp>
+      <p:sp>
+        <p:nvSpPr>
+          <p:cNvPr id="4" name="Date Placeholder 3"/>
           <p:cNvSpPr>
             <a:spLocks noGrp="1"/>
           </p:cNvSpPr>
@@ -455,7 +415,7 @@
           <a:p>
             <a:fld id="{F5C1E949-2315-8048-B2B3-E5DC19E4BEBE}" type="datetimeFigureOut">
               <a:rPr lang="en-US" smtClean="0"/>
-              <a:t>4/11/22</a:t>
+              <a:t>4/20/22</a:t>
             </a:fld>
             <a:endParaRPr lang="en-US"/>
           </a:p>
@@ -463,13 +423,7 @@
       </p:sp>
       <p:sp>
         <p:nvSpPr>
-          <p:cNvPr id="5" name="Footer Placeholder 4">
-            <a:extLst>
-              <a:ext uri="{FF2B5EF4-FFF2-40B4-BE49-F238E27FC236}">
-                <a16:creationId xmlns:a16="http://schemas.microsoft.com/office/drawing/2014/main" id="{4751BBC7-DEF7-4440-8068-54FC6F9770A5}"/>
-              </a:ext>
-            </a:extLst>
-          </p:cNvPr>
+          <p:cNvPr id="5" name="Footer Placeholder 4"/>
           <p:cNvSpPr>
             <a:spLocks noGrp="1"/>
           </p:cNvSpPr>
@@ -488,13 +442,7 @@
       </p:sp>
       <p:sp>
         <p:nvSpPr>
-          <p:cNvPr id="6" name="Slide Number Placeholder 5">
-            <a:extLst>
-              <a:ext uri="{FF2B5EF4-FFF2-40B4-BE49-F238E27FC236}">
-                <a16:creationId xmlns:a16="http://schemas.microsoft.com/office/drawing/2014/main" id="{21868C42-921D-204A-B941-CBAF4CE17978}"/>
-              </a:ext>
-            </a:extLst>
-          </p:cNvPr>
+          <p:cNvPr id="6" name="Slide Number Placeholder 5"/>
           <p:cNvSpPr>
             <a:spLocks noGrp="1"/>
           </p:cNvSpPr>
@@ -518,7 +466,7 @@
     </p:spTree>
     <p:extLst>
       <p:ext uri="{BB962C8B-B14F-4D97-AF65-F5344CB8AC3E}">
-        <p14:creationId xmlns:p14="http://schemas.microsoft.com/office/powerpoint/2010/main" val="1584651872"/>
+        <p14:creationId xmlns:p14="http://schemas.microsoft.com/office/powerpoint/2010/main" val="3555979426"/>
       </p:ext>
     </p:extLst>
   </p:cSld>
@@ -547,13 +495,7 @@
       </p:grpSpPr>
       <p:sp>
         <p:nvSpPr>
-          <p:cNvPr id="2" name="Vertical Title 1">
-            <a:extLst>
-              <a:ext uri="{FF2B5EF4-FFF2-40B4-BE49-F238E27FC236}">
-                <a16:creationId xmlns:a16="http://schemas.microsoft.com/office/drawing/2014/main" id="{BD870D78-743F-764D-B0D0-5A83873ED5A6}"/>
-              </a:ext>
-            </a:extLst>
-          </p:cNvPr>
+          <p:cNvPr id="2" name="Vertical Title 1"/>
           <p:cNvSpPr>
             <a:spLocks noGrp="1"/>
           </p:cNvSpPr>
@@ -563,8 +505,8 @@
         </p:nvSpPr>
         <p:spPr>
           <a:xfrm>
-            <a:off x="8724900" y="365125"/>
-            <a:ext cx="2628900" cy="5811838"/>
+            <a:off x="4907757" y="648942"/>
+            <a:ext cx="1478756" cy="10329466"/>
           </a:xfrm>
         </p:spPr>
         <p:txBody>
@@ -575,18 +517,13 @@
               <a:rPr lang="en-US"/>
               <a:t>Click to edit Master title style</a:t>
             </a:r>
-          </a:p>
-        </p:txBody>
-      </p:sp>
-      <p:sp>
-        <p:nvSpPr>
-          <p:cNvPr id="3" name="Vertical Text Placeholder 2">
-            <a:extLst>
-              <a:ext uri="{FF2B5EF4-FFF2-40B4-BE49-F238E27FC236}">
-                <a16:creationId xmlns:a16="http://schemas.microsoft.com/office/drawing/2014/main" id="{08E5B65D-B720-C34F-9995-16D81C130ACA}"/>
-              </a:ext>
-            </a:extLst>
-          </p:cNvPr>
+            <a:endParaRPr lang="en-US" dirty="0"/>
+          </a:p>
+        </p:txBody>
+      </p:sp>
+      <p:sp>
+        <p:nvSpPr>
+          <p:cNvPr id="3" name="Vertical Text Placeholder 2"/>
           <p:cNvSpPr>
             <a:spLocks noGrp="1"/>
           </p:cNvSpPr>
@@ -596,8 +533,8 @@
         </p:nvSpPr>
         <p:spPr>
           <a:xfrm>
-            <a:off x="838200" y="365125"/>
-            <a:ext cx="7734300" cy="5811838"/>
+            <a:off x="471488" y="648942"/>
+            <a:ext cx="4350544" cy="10329466"/>
           </a:xfrm>
         </p:spPr>
         <p:txBody>
@@ -637,18 +574,13 @@
               <a:rPr lang="en-US"/>
               <a:t>Fifth level</a:t>
             </a:r>
-          </a:p>
-        </p:txBody>
-      </p:sp>
-      <p:sp>
-        <p:nvSpPr>
-          <p:cNvPr id="4" name="Date Placeholder 3">
-            <a:extLst>
-              <a:ext uri="{FF2B5EF4-FFF2-40B4-BE49-F238E27FC236}">
-                <a16:creationId xmlns:a16="http://schemas.microsoft.com/office/drawing/2014/main" id="{0780EB4E-5D80-3C41-87CF-B2FEAFE4F6E8}"/>
-              </a:ext>
-            </a:extLst>
-          </p:cNvPr>
+            <a:endParaRPr lang="en-US" dirty="0"/>
+          </a:p>
+        </p:txBody>
+      </p:sp>
+      <p:sp>
+        <p:nvSpPr>
+          <p:cNvPr id="4" name="Date Placeholder 3"/>
           <p:cNvSpPr>
             <a:spLocks noGrp="1"/>
           </p:cNvSpPr>
@@ -663,7 +595,7 @@
           <a:p>
             <a:fld id="{F5C1E949-2315-8048-B2B3-E5DC19E4BEBE}" type="datetimeFigureOut">
               <a:rPr lang="en-US" smtClean="0"/>
-              <a:t>4/11/22</a:t>
+              <a:t>4/20/22</a:t>
             </a:fld>
             <a:endParaRPr lang="en-US"/>
           </a:p>
@@ -671,13 +603,7 @@
       </p:sp>
       <p:sp>
         <p:nvSpPr>
-          <p:cNvPr id="5" name="Footer Placeholder 4">
-            <a:extLst>
-              <a:ext uri="{FF2B5EF4-FFF2-40B4-BE49-F238E27FC236}">
-                <a16:creationId xmlns:a16="http://schemas.microsoft.com/office/drawing/2014/main" id="{F6D40C9F-3D6A-0249-AB1B-7489C024A20B}"/>
-              </a:ext>
-            </a:extLst>
-          </p:cNvPr>
+          <p:cNvPr id="5" name="Footer Placeholder 4"/>
           <p:cNvSpPr>
             <a:spLocks noGrp="1"/>
           </p:cNvSpPr>
@@ -696,13 +622,7 @@
       </p:sp>
       <p:sp>
         <p:nvSpPr>
-          <p:cNvPr id="6" name="Slide Number Placeholder 5">
-            <a:extLst>
-              <a:ext uri="{FF2B5EF4-FFF2-40B4-BE49-F238E27FC236}">
-                <a16:creationId xmlns:a16="http://schemas.microsoft.com/office/drawing/2014/main" id="{BF23E8BE-5D91-D44C-B8CE-716B71B1E42D}"/>
-              </a:ext>
-            </a:extLst>
-          </p:cNvPr>
+          <p:cNvPr id="6" name="Slide Number Placeholder 5"/>
           <p:cNvSpPr>
             <a:spLocks noGrp="1"/>
           </p:cNvSpPr>
@@ -726,7 +646,7 @@
     </p:spTree>
     <p:extLst>
       <p:ext uri="{BB962C8B-B14F-4D97-AF65-F5344CB8AC3E}">
-        <p14:creationId xmlns:p14="http://schemas.microsoft.com/office/powerpoint/2010/main" val="2741531757"/>
+        <p14:creationId xmlns:p14="http://schemas.microsoft.com/office/powerpoint/2010/main" val="3590017924"/>
       </p:ext>
     </p:extLst>
   </p:cSld>
@@ -755,13 +675,7 @@
       </p:grpSpPr>
       <p:sp>
         <p:nvSpPr>
-          <p:cNvPr id="2" name="Title 1">
-            <a:extLst>
-              <a:ext uri="{FF2B5EF4-FFF2-40B4-BE49-F238E27FC236}">
-                <a16:creationId xmlns:a16="http://schemas.microsoft.com/office/drawing/2014/main" id="{E4CF3BD5-5E75-BC40-8E88-02E300521032}"/>
-              </a:ext>
-            </a:extLst>
-          </p:cNvPr>
+          <p:cNvPr id="2" name="Title 1"/>
           <p:cNvSpPr>
             <a:spLocks noGrp="1"/>
           </p:cNvSpPr>
@@ -778,18 +692,13 @@
               <a:rPr lang="en-US"/>
               <a:t>Click to edit Master title style</a:t>
             </a:r>
-          </a:p>
-        </p:txBody>
-      </p:sp>
-      <p:sp>
-        <p:nvSpPr>
-          <p:cNvPr id="3" name="Content Placeholder 2">
-            <a:extLst>
-              <a:ext uri="{FF2B5EF4-FFF2-40B4-BE49-F238E27FC236}">
-                <a16:creationId xmlns:a16="http://schemas.microsoft.com/office/drawing/2014/main" id="{2C0D2E41-757F-2C47-A2AA-775D291545CC}"/>
-              </a:ext>
-            </a:extLst>
-          </p:cNvPr>
+            <a:endParaRPr lang="en-US" dirty="0"/>
+          </a:p>
+        </p:txBody>
+      </p:sp>
+      <p:sp>
+        <p:nvSpPr>
+          <p:cNvPr id="3" name="Content Placeholder 2"/>
           <p:cNvSpPr>
             <a:spLocks noGrp="1"/>
           </p:cNvSpPr>
@@ -835,18 +744,13 @@
               <a:rPr lang="en-US"/>
               <a:t>Fifth level</a:t>
             </a:r>
-          </a:p>
-        </p:txBody>
-      </p:sp>
-      <p:sp>
-        <p:nvSpPr>
-          <p:cNvPr id="4" name="Date Placeholder 3">
-            <a:extLst>
-              <a:ext uri="{FF2B5EF4-FFF2-40B4-BE49-F238E27FC236}">
-                <a16:creationId xmlns:a16="http://schemas.microsoft.com/office/drawing/2014/main" id="{C0C77AF2-9CA2-CB45-8BA8-586F20E69650}"/>
-              </a:ext>
-            </a:extLst>
-          </p:cNvPr>
+            <a:endParaRPr lang="en-US" dirty="0"/>
+          </a:p>
+        </p:txBody>
+      </p:sp>
+      <p:sp>
+        <p:nvSpPr>
+          <p:cNvPr id="4" name="Date Placeholder 3"/>
           <p:cNvSpPr>
             <a:spLocks noGrp="1"/>
           </p:cNvSpPr>
@@ -861,7 +765,7 @@
           <a:p>
             <a:fld id="{F5C1E949-2315-8048-B2B3-E5DC19E4BEBE}" type="datetimeFigureOut">
               <a:rPr lang="en-US" smtClean="0"/>
-              <a:t>4/11/22</a:t>
+              <a:t>4/20/22</a:t>
             </a:fld>
             <a:endParaRPr lang="en-US"/>
           </a:p>
@@ -869,13 +773,7 @@
       </p:sp>
       <p:sp>
         <p:nvSpPr>
-          <p:cNvPr id="5" name="Footer Placeholder 4">
-            <a:extLst>
-              <a:ext uri="{FF2B5EF4-FFF2-40B4-BE49-F238E27FC236}">
-                <a16:creationId xmlns:a16="http://schemas.microsoft.com/office/drawing/2014/main" id="{E371AB12-892E-F441-A5BD-2294D265D298}"/>
-              </a:ext>
-            </a:extLst>
-          </p:cNvPr>
+          <p:cNvPr id="5" name="Footer Placeholder 4"/>
           <p:cNvSpPr>
             <a:spLocks noGrp="1"/>
           </p:cNvSpPr>
@@ -894,13 +792,7 @@
       </p:sp>
       <p:sp>
         <p:nvSpPr>
-          <p:cNvPr id="6" name="Slide Number Placeholder 5">
-            <a:extLst>
-              <a:ext uri="{FF2B5EF4-FFF2-40B4-BE49-F238E27FC236}">
-                <a16:creationId xmlns:a16="http://schemas.microsoft.com/office/drawing/2014/main" id="{8EB545BF-95DE-984C-82E8-3734195B1B55}"/>
-              </a:ext>
-            </a:extLst>
-          </p:cNvPr>
+          <p:cNvPr id="6" name="Slide Number Placeholder 5"/>
           <p:cNvSpPr>
             <a:spLocks noGrp="1"/>
           </p:cNvSpPr>
@@ -924,7 +816,7 @@
     </p:spTree>
     <p:extLst>
       <p:ext uri="{BB962C8B-B14F-4D97-AF65-F5344CB8AC3E}">
-        <p14:creationId xmlns:p14="http://schemas.microsoft.com/office/powerpoint/2010/main" val="1573441905"/>
+        <p14:creationId xmlns:p14="http://schemas.microsoft.com/office/powerpoint/2010/main" val="124796691"/>
       </p:ext>
     </p:extLst>
   </p:cSld>
@@ -953,13 +845,7 @@
       </p:grpSpPr>
       <p:sp>
         <p:nvSpPr>
-          <p:cNvPr id="2" name="Title 1">
-            <a:extLst>
-              <a:ext uri="{FF2B5EF4-FFF2-40B4-BE49-F238E27FC236}">
-                <a16:creationId xmlns:a16="http://schemas.microsoft.com/office/drawing/2014/main" id="{0F78022D-8B15-F74B-8FB2-FF566691E21C}"/>
-              </a:ext>
-            </a:extLst>
-          </p:cNvPr>
+          <p:cNvPr id="2" name="Title 1"/>
           <p:cNvSpPr>
             <a:spLocks noGrp="1"/>
           </p:cNvSpPr>
@@ -969,15 +855,15 @@
         </p:nvSpPr>
         <p:spPr>
           <a:xfrm>
-            <a:off x="831850" y="1709738"/>
-            <a:ext cx="10515600" cy="2852737"/>
+            <a:off x="467916" y="3038745"/>
+            <a:ext cx="5915025" cy="5070212"/>
           </a:xfrm>
         </p:spPr>
         <p:txBody>
           <a:bodyPr anchor="b"/>
           <a:lstStyle>
             <a:lvl1pPr>
-              <a:defRPr sz="6000"/>
+              <a:defRPr sz="4500"/>
             </a:lvl1pPr>
           </a:lstStyle>
           <a:p>
@@ -985,18 +871,13 @@
               <a:rPr lang="en-US"/>
               <a:t>Click to edit Master title style</a:t>
             </a:r>
-          </a:p>
-        </p:txBody>
-      </p:sp>
-      <p:sp>
-        <p:nvSpPr>
-          <p:cNvPr id="3" name="Text Placeholder 2">
-            <a:extLst>
-              <a:ext uri="{FF2B5EF4-FFF2-40B4-BE49-F238E27FC236}">
-                <a16:creationId xmlns:a16="http://schemas.microsoft.com/office/drawing/2014/main" id="{BF8228B4-4A42-7F4F-8E2F-4CB49E66A593}"/>
-              </a:ext>
-            </a:extLst>
-          </p:cNvPr>
+            <a:endParaRPr lang="en-US" dirty="0"/>
+          </a:p>
+        </p:txBody>
+      </p:sp>
+      <p:sp>
+        <p:nvSpPr>
+          <p:cNvPr id="3" name="Text Placeholder 2"/>
           <p:cNvSpPr>
             <a:spLocks noGrp="1"/>
           </p:cNvSpPr>
@@ -1006,8 +887,8 @@
         </p:nvSpPr>
         <p:spPr>
           <a:xfrm>
-            <a:off x="831850" y="4589463"/>
-            <a:ext cx="10515600" cy="1500187"/>
+            <a:off x="467916" y="8156923"/>
+            <a:ext cx="5915025" cy="2666305"/>
           </a:xfrm>
         </p:spPr>
         <p:txBody>
@@ -1015,17 +896,15 @@
           <a:lstStyle>
             <a:lvl1pPr marL="0" indent="0">
               <a:buNone/>
-              <a:defRPr sz="2400">
+              <a:defRPr sz="1800">
                 <a:solidFill>
-                  <a:schemeClr val="tx1">
-                    <a:tint val="75000"/>
-                  </a:schemeClr>
+                  <a:schemeClr val="tx1"/>
                 </a:solidFill>
               </a:defRPr>
             </a:lvl1pPr>
-            <a:lvl2pPr marL="457200" indent="0">
-              <a:buNone/>
-              <a:defRPr sz="2000">
+            <a:lvl2pPr marL="342900" indent="0">
+              <a:buNone/>
+              <a:defRPr sz="1500">
                 <a:solidFill>
                   <a:schemeClr val="tx1">
                     <a:tint val="75000"/>
@@ -1033,9 +912,9 @@
                 </a:solidFill>
               </a:defRPr>
             </a:lvl2pPr>
-            <a:lvl3pPr marL="914400" indent="0">
-              <a:buNone/>
-              <a:defRPr sz="1800">
+            <a:lvl3pPr marL="685800" indent="0">
+              <a:buNone/>
+              <a:defRPr sz="1350">
                 <a:solidFill>
                   <a:schemeClr val="tx1">
                     <a:tint val="75000"/>
@@ -1043,9 +922,9 @@
                 </a:solidFill>
               </a:defRPr>
             </a:lvl3pPr>
-            <a:lvl4pPr marL="1371600" indent="0">
-              <a:buNone/>
-              <a:defRPr sz="1600">
+            <a:lvl4pPr marL="1028700" indent="0">
+              <a:buNone/>
+              <a:defRPr sz="1200">
                 <a:solidFill>
                   <a:schemeClr val="tx1">
                     <a:tint val="75000"/>
@@ -1053,9 +932,9 @@
                 </a:solidFill>
               </a:defRPr>
             </a:lvl4pPr>
-            <a:lvl5pPr marL="1828800" indent="0">
-              <a:buNone/>
-              <a:defRPr sz="1600">
+            <a:lvl5pPr marL="1371600" indent="0">
+              <a:buNone/>
+              <a:defRPr sz="1200">
                 <a:solidFill>
                   <a:schemeClr val="tx1">
                     <a:tint val="75000"/>
@@ -1063,9 +942,9 @@
                 </a:solidFill>
               </a:defRPr>
             </a:lvl5pPr>
-            <a:lvl6pPr marL="2286000" indent="0">
-              <a:buNone/>
-              <a:defRPr sz="1600">
+            <a:lvl6pPr marL="1714500" indent="0">
+              <a:buNone/>
+              <a:defRPr sz="1200">
                 <a:solidFill>
                   <a:schemeClr val="tx1">
                     <a:tint val="75000"/>
@@ -1073,9 +952,9 @@
                 </a:solidFill>
               </a:defRPr>
             </a:lvl6pPr>
-            <a:lvl7pPr marL="2743200" indent="0">
-              <a:buNone/>
-              <a:defRPr sz="1600">
+            <a:lvl7pPr marL="2057400" indent="0">
+              <a:buNone/>
+              <a:defRPr sz="1200">
                 <a:solidFill>
                   <a:schemeClr val="tx1">
                     <a:tint val="75000"/>
@@ -1083,9 +962,9 @@
                 </a:solidFill>
               </a:defRPr>
             </a:lvl7pPr>
-            <a:lvl8pPr marL="3200400" indent="0">
-              <a:buNone/>
-              <a:defRPr sz="1600">
+            <a:lvl8pPr marL="2400300" indent="0">
+              <a:buNone/>
+              <a:defRPr sz="1200">
                 <a:solidFill>
                   <a:schemeClr val="tx1">
                     <a:tint val="75000"/>
@@ -1093,9 +972,9 @@
                 </a:solidFill>
               </a:defRPr>
             </a:lvl8pPr>
-            <a:lvl9pPr marL="3657600" indent="0">
-              <a:buNone/>
-              <a:defRPr sz="1600">
+            <a:lvl9pPr marL="2743200" indent="0">
+              <a:buNone/>
+              <a:defRPr sz="1200">
                 <a:solidFill>
                   <a:schemeClr val="tx1">
                     <a:tint val="75000"/>
@@ -1115,13 +994,7 @@
       </p:sp>
       <p:sp>
         <p:nvSpPr>
-          <p:cNvPr id="4" name="Date Placeholder 3">
-            <a:extLst>
-              <a:ext uri="{FF2B5EF4-FFF2-40B4-BE49-F238E27FC236}">
-                <a16:creationId xmlns:a16="http://schemas.microsoft.com/office/drawing/2014/main" id="{840F76BD-6AC8-9845-8BCA-BB987A61DE43}"/>
-              </a:ext>
-            </a:extLst>
-          </p:cNvPr>
+          <p:cNvPr id="4" name="Date Placeholder 3"/>
           <p:cNvSpPr>
             <a:spLocks noGrp="1"/>
           </p:cNvSpPr>
@@ -1136,7 +1009,7 @@
           <a:p>
             <a:fld id="{F5C1E949-2315-8048-B2B3-E5DC19E4BEBE}" type="datetimeFigureOut">
               <a:rPr lang="en-US" smtClean="0"/>
-              <a:t>4/11/22</a:t>
+              <a:t>4/20/22</a:t>
             </a:fld>
             <a:endParaRPr lang="en-US"/>
           </a:p>
@@ -1144,13 +1017,7 @@
       </p:sp>
       <p:sp>
         <p:nvSpPr>
-          <p:cNvPr id="5" name="Footer Placeholder 4">
-            <a:extLst>
-              <a:ext uri="{FF2B5EF4-FFF2-40B4-BE49-F238E27FC236}">
-                <a16:creationId xmlns:a16="http://schemas.microsoft.com/office/drawing/2014/main" id="{1977DA51-C1CF-1D40-B7DE-447D7232EAB1}"/>
-              </a:ext>
-            </a:extLst>
-          </p:cNvPr>
+          <p:cNvPr id="5" name="Footer Placeholder 4"/>
           <p:cNvSpPr>
             <a:spLocks noGrp="1"/>
           </p:cNvSpPr>
@@ -1169,13 +1036,7 @@
       </p:sp>
       <p:sp>
         <p:nvSpPr>
-          <p:cNvPr id="6" name="Slide Number Placeholder 5">
-            <a:extLst>
-              <a:ext uri="{FF2B5EF4-FFF2-40B4-BE49-F238E27FC236}">
-                <a16:creationId xmlns:a16="http://schemas.microsoft.com/office/drawing/2014/main" id="{EBC61635-0C1B-7B4B-90BF-F1373B6FB333}"/>
-              </a:ext>
-            </a:extLst>
-          </p:cNvPr>
+          <p:cNvPr id="6" name="Slide Number Placeholder 5"/>
           <p:cNvSpPr>
             <a:spLocks noGrp="1"/>
           </p:cNvSpPr>
@@ -1199,7 +1060,7 @@
     </p:spTree>
     <p:extLst>
       <p:ext uri="{BB962C8B-B14F-4D97-AF65-F5344CB8AC3E}">
-        <p14:creationId xmlns:p14="http://schemas.microsoft.com/office/powerpoint/2010/main" val="3894732739"/>
+        <p14:creationId xmlns:p14="http://schemas.microsoft.com/office/powerpoint/2010/main" val="548939152"/>
       </p:ext>
     </p:extLst>
   </p:cSld>
@@ -1228,13 +1089,7 @@
       </p:grpSpPr>
       <p:sp>
         <p:nvSpPr>
-          <p:cNvPr id="2" name="Title 1">
-            <a:extLst>
-              <a:ext uri="{FF2B5EF4-FFF2-40B4-BE49-F238E27FC236}">
-                <a16:creationId xmlns:a16="http://schemas.microsoft.com/office/drawing/2014/main" id="{3E19B739-DC52-0947-B81A-EFA6B51F496F}"/>
-              </a:ext>
-            </a:extLst>
-          </p:cNvPr>
+          <p:cNvPr id="2" name="Title 1"/>
           <p:cNvSpPr>
             <a:spLocks noGrp="1"/>
           </p:cNvSpPr>
@@ -1251,18 +1106,13 @@
               <a:rPr lang="en-US"/>
               <a:t>Click to edit Master title style</a:t>
             </a:r>
-          </a:p>
-        </p:txBody>
-      </p:sp>
-      <p:sp>
-        <p:nvSpPr>
-          <p:cNvPr id="3" name="Content Placeholder 2">
-            <a:extLst>
-              <a:ext uri="{FF2B5EF4-FFF2-40B4-BE49-F238E27FC236}">
-                <a16:creationId xmlns:a16="http://schemas.microsoft.com/office/drawing/2014/main" id="{4479B450-B84E-9543-866C-D903D8F909E7}"/>
-              </a:ext>
-            </a:extLst>
-          </p:cNvPr>
+            <a:endParaRPr lang="en-US" dirty="0"/>
+          </a:p>
+        </p:txBody>
+      </p:sp>
+      <p:sp>
+        <p:nvSpPr>
+          <p:cNvPr id="3" name="Content Placeholder 2"/>
           <p:cNvSpPr>
             <a:spLocks noGrp="1"/>
           </p:cNvSpPr>
@@ -1272,8 +1122,8 @@
         </p:nvSpPr>
         <p:spPr>
           <a:xfrm>
-            <a:off x="838200" y="1825625"/>
-            <a:ext cx="5181600" cy="4351338"/>
+            <a:off x="471488" y="3244711"/>
+            <a:ext cx="2914650" cy="7733697"/>
           </a:xfrm>
         </p:spPr>
         <p:txBody>
@@ -1313,18 +1163,13 @@
               <a:rPr lang="en-US"/>
               <a:t>Fifth level</a:t>
             </a:r>
-          </a:p>
-        </p:txBody>
-      </p:sp>
-      <p:sp>
-        <p:nvSpPr>
-          <p:cNvPr id="4" name="Content Placeholder 3">
-            <a:extLst>
-              <a:ext uri="{FF2B5EF4-FFF2-40B4-BE49-F238E27FC236}">
-                <a16:creationId xmlns:a16="http://schemas.microsoft.com/office/drawing/2014/main" id="{B64ADFAE-22E0-4144-AD60-57463F0ACF82}"/>
-              </a:ext>
-            </a:extLst>
-          </p:cNvPr>
+            <a:endParaRPr lang="en-US" dirty="0"/>
+          </a:p>
+        </p:txBody>
+      </p:sp>
+      <p:sp>
+        <p:nvSpPr>
+          <p:cNvPr id="4" name="Content Placeholder 3"/>
           <p:cNvSpPr>
             <a:spLocks noGrp="1"/>
           </p:cNvSpPr>
@@ -1334,8 +1179,8 @@
         </p:nvSpPr>
         <p:spPr>
           <a:xfrm>
-            <a:off x="6172200" y="1825625"/>
-            <a:ext cx="5181600" cy="4351338"/>
+            <a:off x="3471863" y="3244711"/>
+            <a:ext cx="2914650" cy="7733697"/>
           </a:xfrm>
         </p:spPr>
         <p:txBody>
@@ -1375,18 +1220,13 @@
               <a:rPr lang="en-US"/>
               <a:t>Fifth level</a:t>
             </a:r>
-          </a:p>
-        </p:txBody>
-      </p:sp>
-      <p:sp>
-        <p:nvSpPr>
-          <p:cNvPr id="5" name="Date Placeholder 4">
-            <a:extLst>
-              <a:ext uri="{FF2B5EF4-FFF2-40B4-BE49-F238E27FC236}">
-                <a16:creationId xmlns:a16="http://schemas.microsoft.com/office/drawing/2014/main" id="{FFA5C227-1ABC-264C-B337-5E1AA88DFD29}"/>
-              </a:ext>
-            </a:extLst>
-          </p:cNvPr>
+            <a:endParaRPr lang="en-US" dirty="0"/>
+          </a:p>
+        </p:txBody>
+      </p:sp>
+      <p:sp>
+        <p:nvSpPr>
+          <p:cNvPr id="5" name="Date Placeholder 4"/>
           <p:cNvSpPr>
             <a:spLocks noGrp="1"/>
           </p:cNvSpPr>
@@ -1401,7 +1241,7 @@
           <a:p>
             <a:fld id="{F5C1E949-2315-8048-B2B3-E5DC19E4BEBE}" type="datetimeFigureOut">
               <a:rPr lang="en-US" smtClean="0"/>
-              <a:t>4/11/22</a:t>
+              <a:t>4/20/22</a:t>
             </a:fld>
             <a:endParaRPr lang="en-US"/>
           </a:p>
@@ -1409,13 +1249,7 @@
       </p:sp>
       <p:sp>
         <p:nvSpPr>
-          <p:cNvPr id="6" name="Footer Placeholder 5">
-            <a:extLst>
-              <a:ext uri="{FF2B5EF4-FFF2-40B4-BE49-F238E27FC236}">
-                <a16:creationId xmlns:a16="http://schemas.microsoft.com/office/drawing/2014/main" id="{9740448A-1EC5-F84C-9FD9-C4310529BEDF}"/>
-              </a:ext>
-            </a:extLst>
-          </p:cNvPr>
+          <p:cNvPr id="6" name="Footer Placeholder 5"/>
           <p:cNvSpPr>
             <a:spLocks noGrp="1"/>
           </p:cNvSpPr>
@@ -1434,13 +1268,7 @@
       </p:sp>
       <p:sp>
         <p:nvSpPr>
-          <p:cNvPr id="7" name="Slide Number Placeholder 6">
-            <a:extLst>
-              <a:ext uri="{FF2B5EF4-FFF2-40B4-BE49-F238E27FC236}">
-                <a16:creationId xmlns:a16="http://schemas.microsoft.com/office/drawing/2014/main" id="{36FE9922-A40D-174B-861C-D8B2128BE631}"/>
-              </a:ext>
-            </a:extLst>
-          </p:cNvPr>
+          <p:cNvPr id="7" name="Slide Number Placeholder 6"/>
           <p:cNvSpPr>
             <a:spLocks noGrp="1"/>
           </p:cNvSpPr>
@@ -1464,7 +1292,7 @@
     </p:spTree>
     <p:extLst>
       <p:ext uri="{BB962C8B-B14F-4D97-AF65-F5344CB8AC3E}">
-        <p14:creationId xmlns:p14="http://schemas.microsoft.com/office/powerpoint/2010/main" val="2037214077"/>
+        <p14:creationId xmlns:p14="http://schemas.microsoft.com/office/powerpoint/2010/main" val="3294431899"/>
       </p:ext>
     </p:extLst>
   </p:cSld>
@@ -1493,13 +1321,7 @@
       </p:grpSpPr>
       <p:sp>
         <p:nvSpPr>
-          <p:cNvPr id="2" name="Title 1">
-            <a:extLst>
-              <a:ext uri="{FF2B5EF4-FFF2-40B4-BE49-F238E27FC236}">
-                <a16:creationId xmlns:a16="http://schemas.microsoft.com/office/drawing/2014/main" id="{E7608CA1-E30F-7440-87A0-D34ED40E6838}"/>
-              </a:ext>
-            </a:extLst>
-          </p:cNvPr>
+          <p:cNvPr id="2" name="Title 1"/>
           <p:cNvSpPr>
             <a:spLocks noGrp="1"/>
           </p:cNvSpPr>
@@ -1509,8 +1331,8 @@
         </p:nvSpPr>
         <p:spPr>
           <a:xfrm>
-            <a:off x="839788" y="365125"/>
-            <a:ext cx="10515600" cy="1325563"/>
+            <a:off x="472381" y="648945"/>
+            <a:ext cx="5915025" cy="2355943"/>
           </a:xfrm>
         </p:spPr>
         <p:txBody>
@@ -1521,18 +1343,13 @@
               <a:rPr lang="en-US"/>
               <a:t>Click to edit Master title style</a:t>
             </a:r>
-          </a:p>
-        </p:txBody>
-      </p:sp>
-      <p:sp>
-        <p:nvSpPr>
-          <p:cNvPr id="3" name="Text Placeholder 2">
-            <a:extLst>
-              <a:ext uri="{FF2B5EF4-FFF2-40B4-BE49-F238E27FC236}">
-                <a16:creationId xmlns:a16="http://schemas.microsoft.com/office/drawing/2014/main" id="{18285D9E-86C5-CB45-9A5E-0DC5C3588FC2}"/>
-              </a:ext>
-            </a:extLst>
-          </p:cNvPr>
+            <a:endParaRPr lang="en-US" dirty="0"/>
+          </a:p>
+        </p:txBody>
+      </p:sp>
+      <p:sp>
+        <p:nvSpPr>
+          <p:cNvPr id="3" name="Text Placeholder 2"/>
           <p:cNvSpPr>
             <a:spLocks noGrp="1"/>
           </p:cNvSpPr>
@@ -1542,8 +1359,8 @@
         </p:nvSpPr>
         <p:spPr>
           <a:xfrm>
-            <a:off x="839788" y="1681163"/>
-            <a:ext cx="5157787" cy="823912"/>
+            <a:off x="472381" y="2987956"/>
+            <a:ext cx="2901255" cy="1464351"/>
           </a:xfrm>
         </p:spPr>
         <p:txBody>
@@ -1551,39 +1368,39 @@
           <a:lstStyle>
             <a:lvl1pPr marL="0" indent="0">
               <a:buNone/>
-              <a:defRPr sz="2400" b="1"/>
+              <a:defRPr sz="1800" b="1"/>
             </a:lvl1pPr>
-            <a:lvl2pPr marL="457200" indent="0">
-              <a:buNone/>
-              <a:defRPr sz="2000" b="1"/>
+            <a:lvl2pPr marL="342900" indent="0">
+              <a:buNone/>
+              <a:defRPr sz="1500" b="1"/>
             </a:lvl2pPr>
-            <a:lvl3pPr marL="914400" indent="0">
-              <a:buNone/>
-              <a:defRPr sz="1800" b="1"/>
+            <a:lvl3pPr marL="685800" indent="0">
+              <a:buNone/>
+              <a:defRPr sz="1350" b="1"/>
             </a:lvl3pPr>
-            <a:lvl4pPr marL="1371600" indent="0">
-              <a:buNone/>
-              <a:defRPr sz="1600" b="1"/>
+            <a:lvl4pPr marL="1028700" indent="0">
+              <a:buNone/>
+              <a:defRPr sz="1200" b="1"/>
             </a:lvl4pPr>
-            <a:lvl5pPr marL="1828800" indent="0">
-              <a:buNone/>
-              <a:defRPr sz="1600" b="1"/>
+            <a:lvl5pPr marL="1371600" indent="0">
+              <a:buNone/>
+              <a:defRPr sz="1200" b="1"/>
             </a:lvl5pPr>
-            <a:lvl6pPr marL="2286000" indent="0">
-              <a:buNone/>
-              <a:defRPr sz="1600" b="1"/>
+            <a:lvl6pPr marL="1714500" indent="0">
+              <a:buNone/>
+              <a:defRPr sz="1200" b="1"/>
             </a:lvl6pPr>
-            <a:lvl7pPr marL="2743200" indent="0">
-              <a:buNone/>
-              <a:defRPr sz="1600" b="1"/>
+            <a:lvl7pPr marL="2057400" indent="0">
+              <a:buNone/>
+              <a:defRPr sz="1200" b="1"/>
             </a:lvl7pPr>
-            <a:lvl8pPr marL="3200400" indent="0">
-              <a:buNone/>
-              <a:defRPr sz="1600" b="1"/>
+            <a:lvl8pPr marL="2400300" indent="0">
+              <a:buNone/>
+              <a:defRPr sz="1200" b="1"/>
             </a:lvl8pPr>
-            <a:lvl9pPr marL="3657600" indent="0">
-              <a:buNone/>
-              <a:defRPr sz="1600" b="1"/>
+            <a:lvl9pPr marL="2743200" indent="0">
+              <a:buNone/>
+              <a:defRPr sz="1200" b="1"/>
             </a:lvl9pPr>
           </a:lstStyle>
           <a:p>
@@ -1597,13 +1414,7 @@
       </p:sp>
       <p:sp>
         <p:nvSpPr>
-          <p:cNvPr id="4" name="Content Placeholder 3">
-            <a:extLst>
-              <a:ext uri="{FF2B5EF4-FFF2-40B4-BE49-F238E27FC236}">
-                <a16:creationId xmlns:a16="http://schemas.microsoft.com/office/drawing/2014/main" id="{475917C7-1008-2A4B-9440-0956A3708242}"/>
-              </a:ext>
-            </a:extLst>
-          </p:cNvPr>
+          <p:cNvPr id="4" name="Content Placeholder 3"/>
           <p:cNvSpPr>
             <a:spLocks noGrp="1"/>
           </p:cNvSpPr>
@@ -1613,8 +1424,8 @@
         </p:nvSpPr>
         <p:spPr>
           <a:xfrm>
-            <a:off x="839788" y="2505075"/>
-            <a:ext cx="5157787" cy="3684588"/>
+            <a:off x="472381" y="4452307"/>
+            <a:ext cx="2901255" cy="6548673"/>
           </a:xfrm>
         </p:spPr>
         <p:txBody>
@@ -1654,18 +1465,13 @@
               <a:rPr lang="en-US"/>
               <a:t>Fifth level</a:t>
             </a:r>
-          </a:p>
-        </p:txBody>
-      </p:sp>
-      <p:sp>
-        <p:nvSpPr>
-          <p:cNvPr id="5" name="Text Placeholder 4">
-            <a:extLst>
-              <a:ext uri="{FF2B5EF4-FFF2-40B4-BE49-F238E27FC236}">
-                <a16:creationId xmlns:a16="http://schemas.microsoft.com/office/drawing/2014/main" id="{2093CE55-D974-2047-8A38-28296938D629}"/>
-              </a:ext>
-            </a:extLst>
-          </p:cNvPr>
+            <a:endParaRPr lang="en-US" dirty="0"/>
+          </a:p>
+        </p:txBody>
+      </p:sp>
+      <p:sp>
+        <p:nvSpPr>
+          <p:cNvPr id="5" name="Text Placeholder 4"/>
           <p:cNvSpPr>
             <a:spLocks noGrp="1"/>
           </p:cNvSpPr>
@@ -1675,8 +1481,8 @@
         </p:nvSpPr>
         <p:spPr>
           <a:xfrm>
-            <a:off x="6172200" y="1681163"/>
-            <a:ext cx="5183188" cy="823912"/>
+            <a:off x="3471863" y="2987956"/>
+            <a:ext cx="2915543" cy="1464351"/>
           </a:xfrm>
         </p:spPr>
         <p:txBody>
@@ -1684,39 +1490,39 @@
           <a:lstStyle>
             <a:lvl1pPr marL="0" indent="0">
               <a:buNone/>
-              <a:defRPr sz="2400" b="1"/>
+              <a:defRPr sz="1800" b="1"/>
             </a:lvl1pPr>
-            <a:lvl2pPr marL="457200" indent="0">
-              <a:buNone/>
-              <a:defRPr sz="2000" b="1"/>
+            <a:lvl2pPr marL="342900" indent="0">
+              <a:buNone/>
+              <a:defRPr sz="1500" b="1"/>
             </a:lvl2pPr>
-            <a:lvl3pPr marL="914400" indent="0">
-              <a:buNone/>
-              <a:defRPr sz="1800" b="1"/>
+            <a:lvl3pPr marL="685800" indent="0">
+              <a:buNone/>
+              <a:defRPr sz="1350" b="1"/>
             </a:lvl3pPr>
-            <a:lvl4pPr marL="1371600" indent="0">
-              <a:buNone/>
-              <a:defRPr sz="1600" b="1"/>
+            <a:lvl4pPr marL="1028700" indent="0">
+              <a:buNone/>
+              <a:defRPr sz="1200" b="1"/>
             </a:lvl4pPr>
-            <a:lvl5pPr marL="1828800" indent="0">
-              <a:buNone/>
-              <a:defRPr sz="1600" b="1"/>
+            <a:lvl5pPr marL="1371600" indent="0">
+              <a:buNone/>
+              <a:defRPr sz="1200" b="1"/>
             </a:lvl5pPr>
-            <a:lvl6pPr marL="2286000" indent="0">
-              <a:buNone/>
-              <a:defRPr sz="1600" b="1"/>
+            <a:lvl6pPr marL="1714500" indent="0">
+              <a:buNone/>
+              <a:defRPr sz="1200" b="1"/>
             </a:lvl6pPr>
-            <a:lvl7pPr marL="2743200" indent="0">
-              <a:buNone/>
-              <a:defRPr sz="1600" b="1"/>
+            <a:lvl7pPr marL="2057400" indent="0">
+              <a:buNone/>
+              <a:defRPr sz="1200" b="1"/>
             </a:lvl7pPr>
-            <a:lvl8pPr marL="3200400" indent="0">
-              <a:buNone/>
-              <a:defRPr sz="1600" b="1"/>
+            <a:lvl8pPr marL="2400300" indent="0">
+              <a:buNone/>
+              <a:defRPr sz="1200" b="1"/>
             </a:lvl8pPr>
-            <a:lvl9pPr marL="3657600" indent="0">
-              <a:buNone/>
-              <a:defRPr sz="1600" b="1"/>
+            <a:lvl9pPr marL="2743200" indent="0">
+              <a:buNone/>
+              <a:defRPr sz="1200" b="1"/>
             </a:lvl9pPr>
           </a:lstStyle>
           <a:p>
@@ -1730,13 +1536,7 @@
       </p:sp>
       <p:sp>
         <p:nvSpPr>
-          <p:cNvPr id="6" name="Content Placeholder 5">
-            <a:extLst>
-              <a:ext uri="{FF2B5EF4-FFF2-40B4-BE49-F238E27FC236}">
-                <a16:creationId xmlns:a16="http://schemas.microsoft.com/office/drawing/2014/main" id="{03B429FB-1246-1A47-8DE2-A22953B210B4}"/>
-              </a:ext>
-            </a:extLst>
-          </p:cNvPr>
+          <p:cNvPr id="6" name="Content Placeholder 5"/>
           <p:cNvSpPr>
             <a:spLocks noGrp="1"/>
           </p:cNvSpPr>
@@ -1746,8 +1546,8 @@
         </p:nvSpPr>
         <p:spPr>
           <a:xfrm>
-            <a:off x="6172200" y="2505075"/>
-            <a:ext cx="5183188" cy="3684588"/>
+            <a:off x="3471863" y="4452307"/>
+            <a:ext cx="2915543" cy="6548673"/>
           </a:xfrm>
         </p:spPr>
         <p:txBody>
@@ -1787,18 +1587,13 @@
               <a:rPr lang="en-US"/>
               <a:t>Fifth level</a:t>
             </a:r>
-          </a:p>
-        </p:txBody>
-      </p:sp>
-      <p:sp>
-        <p:nvSpPr>
-          <p:cNvPr id="7" name="Date Placeholder 6">
-            <a:extLst>
-              <a:ext uri="{FF2B5EF4-FFF2-40B4-BE49-F238E27FC236}">
-                <a16:creationId xmlns:a16="http://schemas.microsoft.com/office/drawing/2014/main" id="{EC46A582-8416-6B43-BD9A-3F802CC66003}"/>
-              </a:ext>
-            </a:extLst>
-          </p:cNvPr>
+            <a:endParaRPr lang="en-US" dirty="0"/>
+          </a:p>
+        </p:txBody>
+      </p:sp>
+      <p:sp>
+        <p:nvSpPr>
+          <p:cNvPr id="7" name="Date Placeholder 6"/>
           <p:cNvSpPr>
             <a:spLocks noGrp="1"/>
           </p:cNvSpPr>
@@ -1813,7 +1608,7 @@
           <a:p>
             <a:fld id="{F5C1E949-2315-8048-B2B3-E5DC19E4BEBE}" type="datetimeFigureOut">
               <a:rPr lang="en-US" smtClean="0"/>
-              <a:t>4/11/22</a:t>
+              <a:t>4/20/22</a:t>
             </a:fld>
             <a:endParaRPr lang="en-US"/>
           </a:p>
@@ -1821,13 +1616,7 @@
       </p:sp>
       <p:sp>
         <p:nvSpPr>
-          <p:cNvPr id="8" name="Footer Placeholder 7">
-            <a:extLst>
-              <a:ext uri="{FF2B5EF4-FFF2-40B4-BE49-F238E27FC236}">
-                <a16:creationId xmlns:a16="http://schemas.microsoft.com/office/drawing/2014/main" id="{BC7F027A-1276-B74D-8B41-22CA7A99F899}"/>
-              </a:ext>
-            </a:extLst>
-          </p:cNvPr>
+          <p:cNvPr id="8" name="Footer Placeholder 7"/>
           <p:cNvSpPr>
             <a:spLocks noGrp="1"/>
           </p:cNvSpPr>
@@ -1846,13 +1635,7 @@
       </p:sp>
       <p:sp>
         <p:nvSpPr>
-          <p:cNvPr id="9" name="Slide Number Placeholder 8">
-            <a:extLst>
-              <a:ext uri="{FF2B5EF4-FFF2-40B4-BE49-F238E27FC236}">
-                <a16:creationId xmlns:a16="http://schemas.microsoft.com/office/drawing/2014/main" id="{26896EB9-05AF-8641-A2AD-223658006B46}"/>
-              </a:ext>
-            </a:extLst>
-          </p:cNvPr>
+          <p:cNvPr id="9" name="Slide Number Placeholder 8"/>
           <p:cNvSpPr>
             <a:spLocks noGrp="1"/>
           </p:cNvSpPr>
@@ -1876,7 +1659,7 @@
     </p:spTree>
     <p:extLst>
       <p:ext uri="{BB962C8B-B14F-4D97-AF65-F5344CB8AC3E}">
-        <p14:creationId xmlns:p14="http://schemas.microsoft.com/office/powerpoint/2010/main" val="3940606194"/>
+        <p14:creationId xmlns:p14="http://schemas.microsoft.com/office/powerpoint/2010/main" val="868564746"/>
       </p:ext>
     </p:extLst>
   </p:cSld>
@@ -1905,13 +1688,7 @@
       </p:grpSpPr>
       <p:sp>
         <p:nvSpPr>
-          <p:cNvPr id="2" name="Title 1">
-            <a:extLst>
-              <a:ext uri="{FF2B5EF4-FFF2-40B4-BE49-F238E27FC236}">
-                <a16:creationId xmlns:a16="http://schemas.microsoft.com/office/drawing/2014/main" id="{AF00AE1A-CEC7-D441-AD37-DFEE7098C5BF}"/>
-              </a:ext>
-            </a:extLst>
-          </p:cNvPr>
+          <p:cNvPr id="2" name="Title 1"/>
           <p:cNvSpPr>
             <a:spLocks noGrp="1"/>
           </p:cNvSpPr>
@@ -1928,18 +1705,13 @@
               <a:rPr lang="en-US"/>
               <a:t>Click to edit Master title style</a:t>
             </a:r>
-          </a:p>
-        </p:txBody>
-      </p:sp>
-      <p:sp>
-        <p:nvSpPr>
-          <p:cNvPr id="3" name="Date Placeholder 2">
-            <a:extLst>
-              <a:ext uri="{FF2B5EF4-FFF2-40B4-BE49-F238E27FC236}">
-                <a16:creationId xmlns:a16="http://schemas.microsoft.com/office/drawing/2014/main" id="{4BACDAAB-D39B-1B47-88DC-E4754BAA8AF7}"/>
-              </a:ext>
-            </a:extLst>
-          </p:cNvPr>
+            <a:endParaRPr lang="en-US" dirty="0"/>
+          </a:p>
+        </p:txBody>
+      </p:sp>
+      <p:sp>
+        <p:nvSpPr>
+          <p:cNvPr id="3" name="Date Placeholder 2"/>
           <p:cNvSpPr>
             <a:spLocks noGrp="1"/>
           </p:cNvSpPr>
@@ -1954,7 +1726,7 @@
           <a:p>
             <a:fld id="{F5C1E949-2315-8048-B2B3-E5DC19E4BEBE}" type="datetimeFigureOut">
               <a:rPr lang="en-US" smtClean="0"/>
-              <a:t>4/11/22</a:t>
+              <a:t>4/20/22</a:t>
             </a:fld>
             <a:endParaRPr lang="en-US"/>
           </a:p>
@@ -1962,13 +1734,7 @@
       </p:sp>
       <p:sp>
         <p:nvSpPr>
-          <p:cNvPr id="4" name="Footer Placeholder 3">
-            <a:extLst>
-              <a:ext uri="{FF2B5EF4-FFF2-40B4-BE49-F238E27FC236}">
-                <a16:creationId xmlns:a16="http://schemas.microsoft.com/office/drawing/2014/main" id="{226326AC-B88F-0E4D-B088-340E43CD086E}"/>
-              </a:ext>
-            </a:extLst>
-          </p:cNvPr>
+          <p:cNvPr id="4" name="Footer Placeholder 3"/>
           <p:cNvSpPr>
             <a:spLocks noGrp="1"/>
           </p:cNvSpPr>
@@ -1987,13 +1753,7 @@
       </p:sp>
       <p:sp>
         <p:nvSpPr>
-          <p:cNvPr id="5" name="Slide Number Placeholder 4">
-            <a:extLst>
-              <a:ext uri="{FF2B5EF4-FFF2-40B4-BE49-F238E27FC236}">
-                <a16:creationId xmlns:a16="http://schemas.microsoft.com/office/drawing/2014/main" id="{D23EC94E-CC4B-4249-8A9A-58217951BB96}"/>
-              </a:ext>
-            </a:extLst>
-          </p:cNvPr>
+          <p:cNvPr id="5" name="Slide Number Placeholder 4"/>
           <p:cNvSpPr>
             <a:spLocks noGrp="1"/>
           </p:cNvSpPr>
@@ -2017,7 +1777,7 @@
     </p:spTree>
     <p:extLst>
       <p:ext uri="{BB962C8B-B14F-4D97-AF65-F5344CB8AC3E}">
-        <p14:creationId xmlns:p14="http://schemas.microsoft.com/office/powerpoint/2010/main" val="276402231"/>
+        <p14:creationId xmlns:p14="http://schemas.microsoft.com/office/powerpoint/2010/main" val="2264792487"/>
       </p:ext>
     </p:extLst>
   </p:cSld>
@@ -2046,13 +1806,7 @@
       </p:grpSpPr>
       <p:sp>
         <p:nvSpPr>
-          <p:cNvPr id="2" name="Date Placeholder 1">
-            <a:extLst>
-              <a:ext uri="{FF2B5EF4-FFF2-40B4-BE49-F238E27FC236}">
-                <a16:creationId xmlns:a16="http://schemas.microsoft.com/office/drawing/2014/main" id="{4514129F-5E19-984A-87C4-8C106346A239}"/>
-              </a:ext>
-            </a:extLst>
-          </p:cNvPr>
+          <p:cNvPr id="2" name="Date Placeholder 1"/>
           <p:cNvSpPr>
             <a:spLocks noGrp="1"/>
           </p:cNvSpPr>
@@ -2067,7 +1821,7 @@
           <a:p>
             <a:fld id="{F5C1E949-2315-8048-B2B3-E5DC19E4BEBE}" type="datetimeFigureOut">
               <a:rPr lang="en-US" smtClean="0"/>
-              <a:t>4/11/22</a:t>
+              <a:t>4/20/22</a:t>
             </a:fld>
             <a:endParaRPr lang="en-US"/>
           </a:p>
@@ -2075,13 +1829,7 @@
       </p:sp>
       <p:sp>
         <p:nvSpPr>
-          <p:cNvPr id="3" name="Footer Placeholder 2">
-            <a:extLst>
-              <a:ext uri="{FF2B5EF4-FFF2-40B4-BE49-F238E27FC236}">
-                <a16:creationId xmlns:a16="http://schemas.microsoft.com/office/drawing/2014/main" id="{B7A3181C-F7CE-C04C-B0BA-77C4CDD8E6B0}"/>
-              </a:ext>
-            </a:extLst>
-          </p:cNvPr>
+          <p:cNvPr id="3" name="Footer Placeholder 2"/>
           <p:cNvSpPr>
             <a:spLocks noGrp="1"/>
           </p:cNvSpPr>
@@ -2100,13 +1848,7 @@
       </p:sp>
       <p:sp>
         <p:nvSpPr>
-          <p:cNvPr id="4" name="Slide Number Placeholder 3">
-            <a:extLst>
-              <a:ext uri="{FF2B5EF4-FFF2-40B4-BE49-F238E27FC236}">
-                <a16:creationId xmlns:a16="http://schemas.microsoft.com/office/drawing/2014/main" id="{027E4478-1FCD-B94E-9B75-9008A1C525E5}"/>
-              </a:ext>
-            </a:extLst>
-          </p:cNvPr>
+          <p:cNvPr id="4" name="Slide Number Placeholder 3"/>
           <p:cNvSpPr>
             <a:spLocks noGrp="1"/>
           </p:cNvSpPr>
@@ -2130,7 +1872,7 @@
     </p:spTree>
     <p:extLst>
       <p:ext uri="{BB962C8B-B14F-4D97-AF65-F5344CB8AC3E}">
-        <p14:creationId xmlns:p14="http://schemas.microsoft.com/office/powerpoint/2010/main" val="1688611916"/>
+        <p14:creationId xmlns:p14="http://schemas.microsoft.com/office/powerpoint/2010/main" val="747405793"/>
       </p:ext>
     </p:extLst>
   </p:cSld>
@@ -2159,13 +1901,7 @@
       </p:grpSpPr>
       <p:sp>
         <p:nvSpPr>
-          <p:cNvPr id="2" name="Title 1">
-            <a:extLst>
-              <a:ext uri="{FF2B5EF4-FFF2-40B4-BE49-F238E27FC236}">
-                <a16:creationId xmlns:a16="http://schemas.microsoft.com/office/drawing/2014/main" id="{A471A00E-CB60-DB4A-AF3B-CAF8F9429CD2}"/>
-              </a:ext>
-            </a:extLst>
-          </p:cNvPr>
+          <p:cNvPr id="2" name="Title 1"/>
           <p:cNvSpPr>
             <a:spLocks noGrp="1"/>
           </p:cNvSpPr>
@@ -2175,15 +1911,15 @@
         </p:nvSpPr>
         <p:spPr>
           <a:xfrm>
-            <a:off x="839788" y="457200"/>
-            <a:ext cx="3932237" cy="1600200"/>
+            <a:off x="472381" y="812588"/>
+            <a:ext cx="2211884" cy="2844059"/>
           </a:xfrm>
         </p:spPr>
         <p:txBody>
           <a:bodyPr anchor="b"/>
           <a:lstStyle>
             <a:lvl1pPr>
-              <a:defRPr sz="3200"/>
+              <a:defRPr sz="2400"/>
             </a:lvl1pPr>
           </a:lstStyle>
           <a:p>
@@ -2191,18 +1927,13 @@
               <a:rPr lang="en-US"/>
               <a:t>Click to edit Master title style</a:t>
             </a:r>
-          </a:p>
-        </p:txBody>
-      </p:sp>
-      <p:sp>
-        <p:nvSpPr>
-          <p:cNvPr id="3" name="Content Placeholder 2">
-            <a:extLst>
-              <a:ext uri="{FF2B5EF4-FFF2-40B4-BE49-F238E27FC236}">
-                <a16:creationId xmlns:a16="http://schemas.microsoft.com/office/drawing/2014/main" id="{3BC6B417-6BC9-BD4F-BDBE-CAA1F199D66C}"/>
-              </a:ext>
-            </a:extLst>
-          </p:cNvPr>
+            <a:endParaRPr lang="en-US" dirty="0"/>
+          </a:p>
+        </p:txBody>
+      </p:sp>
+      <p:sp>
+        <p:nvSpPr>
+          <p:cNvPr id="3" name="Content Placeholder 2"/>
           <p:cNvSpPr>
             <a:spLocks noGrp="1"/>
           </p:cNvSpPr>
@@ -2212,39 +1943,39 @@
         </p:nvSpPr>
         <p:spPr>
           <a:xfrm>
-            <a:off x="5183188" y="987425"/>
-            <a:ext cx="6172200" cy="4873625"/>
+            <a:off x="2915543" y="1754968"/>
+            <a:ext cx="3471863" cy="8661966"/>
           </a:xfrm>
         </p:spPr>
         <p:txBody>
           <a:bodyPr/>
           <a:lstStyle>
             <a:lvl1pPr>
-              <a:defRPr sz="3200"/>
+              <a:defRPr sz="2400"/>
             </a:lvl1pPr>
             <a:lvl2pPr>
-              <a:defRPr sz="2800"/>
+              <a:defRPr sz="2100"/>
             </a:lvl2pPr>
             <a:lvl3pPr>
-              <a:defRPr sz="2400"/>
+              <a:defRPr sz="1800"/>
             </a:lvl3pPr>
             <a:lvl4pPr>
-              <a:defRPr sz="2000"/>
+              <a:defRPr sz="1500"/>
             </a:lvl4pPr>
             <a:lvl5pPr>
-              <a:defRPr sz="2000"/>
+              <a:defRPr sz="1500"/>
             </a:lvl5pPr>
             <a:lvl6pPr>
-              <a:defRPr sz="2000"/>
+              <a:defRPr sz="1500"/>
             </a:lvl6pPr>
             <a:lvl7pPr>
-              <a:defRPr sz="2000"/>
+              <a:defRPr sz="1500"/>
             </a:lvl7pPr>
             <a:lvl8pPr>
-              <a:defRPr sz="2000"/>
+              <a:defRPr sz="1500"/>
             </a:lvl8pPr>
             <a:lvl9pPr>
-              <a:defRPr sz="2000"/>
+              <a:defRPr sz="1500"/>
             </a:lvl9pPr>
           </a:lstStyle>
           <a:p>
@@ -2281,18 +2012,13 @@
               <a:rPr lang="en-US"/>
               <a:t>Fifth level</a:t>
             </a:r>
-          </a:p>
-        </p:txBody>
-      </p:sp>
-      <p:sp>
-        <p:nvSpPr>
-          <p:cNvPr id="4" name="Text Placeholder 3">
-            <a:extLst>
-              <a:ext uri="{FF2B5EF4-FFF2-40B4-BE49-F238E27FC236}">
-                <a16:creationId xmlns:a16="http://schemas.microsoft.com/office/drawing/2014/main" id="{A21E5C0F-4150-4641-979C-D85680574043}"/>
-              </a:ext>
-            </a:extLst>
-          </p:cNvPr>
+            <a:endParaRPr lang="en-US" dirty="0"/>
+          </a:p>
+        </p:txBody>
+      </p:sp>
+      <p:sp>
+        <p:nvSpPr>
+          <p:cNvPr id="4" name="Text Placeholder 3"/>
           <p:cNvSpPr>
             <a:spLocks noGrp="1"/>
           </p:cNvSpPr>
@@ -2302,8 +2028,8 @@
         </p:nvSpPr>
         <p:spPr>
           <a:xfrm>
-            <a:off x="839788" y="2057400"/>
-            <a:ext cx="3932237" cy="3811588"/>
+            <a:off x="472381" y="3656647"/>
+            <a:ext cx="2211884" cy="6774392"/>
           </a:xfrm>
         </p:spPr>
         <p:txBody>
@@ -2311,39 +2037,39 @@
           <a:lstStyle>
             <a:lvl1pPr marL="0" indent="0">
               <a:buNone/>
-              <a:defRPr sz="1600"/>
+              <a:defRPr sz="1200"/>
             </a:lvl1pPr>
-            <a:lvl2pPr marL="457200" indent="0">
-              <a:buNone/>
-              <a:defRPr sz="1400"/>
+            <a:lvl2pPr marL="342900" indent="0">
+              <a:buNone/>
+              <a:defRPr sz="1050"/>
             </a:lvl2pPr>
-            <a:lvl3pPr marL="914400" indent="0">
-              <a:buNone/>
-              <a:defRPr sz="1200"/>
+            <a:lvl3pPr marL="685800" indent="0">
+              <a:buNone/>
+              <a:defRPr sz="900"/>
             </a:lvl3pPr>
-            <a:lvl4pPr marL="1371600" indent="0">
-              <a:buNone/>
-              <a:defRPr sz="1000"/>
+            <a:lvl4pPr marL="1028700" indent="0">
+              <a:buNone/>
+              <a:defRPr sz="750"/>
             </a:lvl4pPr>
-            <a:lvl5pPr marL="1828800" indent="0">
-              <a:buNone/>
-              <a:defRPr sz="1000"/>
+            <a:lvl5pPr marL="1371600" indent="0">
+              <a:buNone/>
+              <a:defRPr sz="750"/>
             </a:lvl5pPr>
-            <a:lvl6pPr marL="2286000" indent="0">
-              <a:buNone/>
-              <a:defRPr sz="1000"/>
+            <a:lvl6pPr marL="1714500" indent="0">
+              <a:buNone/>
+              <a:defRPr sz="750"/>
             </a:lvl6pPr>
-            <a:lvl7pPr marL="2743200" indent="0">
-              <a:buNone/>
-              <a:defRPr sz="1000"/>
+            <a:lvl7pPr marL="2057400" indent="0">
+              <a:buNone/>
+              <a:defRPr sz="750"/>
             </a:lvl7pPr>
-            <a:lvl8pPr marL="3200400" indent="0">
-              <a:buNone/>
-              <a:defRPr sz="1000"/>
+            <a:lvl8pPr marL="2400300" indent="0">
+              <a:buNone/>
+              <a:defRPr sz="750"/>
             </a:lvl8pPr>
-            <a:lvl9pPr marL="3657600" indent="0">
-              <a:buNone/>
-              <a:defRPr sz="1000"/>
+            <a:lvl9pPr marL="2743200" indent="0">
+              <a:buNone/>
+              <a:defRPr sz="750"/>
             </a:lvl9pPr>
           </a:lstStyle>
           <a:p>
@@ -2357,13 +2083,7 @@
       </p:sp>
       <p:sp>
         <p:nvSpPr>
-          <p:cNvPr id="5" name="Date Placeholder 4">
-            <a:extLst>
-              <a:ext uri="{FF2B5EF4-FFF2-40B4-BE49-F238E27FC236}">
-                <a16:creationId xmlns:a16="http://schemas.microsoft.com/office/drawing/2014/main" id="{A891FE83-1A40-AC48-8498-A93769088BE5}"/>
-              </a:ext>
-            </a:extLst>
-          </p:cNvPr>
+          <p:cNvPr id="5" name="Date Placeholder 4"/>
           <p:cNvSpPr>
             <a:spLocks noGrp="1"/>
           </p:cNvSpPr>
@@ -2378,7 +2098,7 @@
           <a:p>
             <a:fld id="{F5C1E949-2315-8048-B2B3-E5DC19E4BEBE}" type="datetimeFigureOut">
               <a:rPr lang="en-US" smtClean="0"/>
-              <a:t>4/11/22</a:t>
+              <a:t>4/20/22</a:t>
             </a:fld>
             <a:endParaRPr lang="en-US"/>
           </a:p>
@@ -2386,13 +2106,7 @@
       </p:sp>
       <p:sp>
         <p:nvSpPr>
-          <p:cNvPr id="6" name="Footer Placeholder 5">
-            <a:extLst>
-              <a:ext uri="{FF2B5EF4-FFF2-40B4-BE49-F238E27FC236}">
-                <a16:creationId xmlns:a16="http://schemas.microsoft.com/office/drawing/2014/main" id="{573C469E-1B0A-4644-9BBD-D1CCF3C4464A}"/>
-              </a:ext>
-            </a:extLst>
-          </p:cNvPr>
+          <p:cNvPr id="6" name="Footer Placeholder 5"/>
           <p:cNvSpPr>
             <a:spLocks noGrp="1"/>
           </p:cNvSpPr>
@@ -2411,13 +2125,7 @@
       </p:sp>
       <p:sp>
         <p:nvSpPr>
-          <p:cNvPr id="7" name="Slide Number Placeholder 6">
-            <a:extLst>
-              <a:ext uri="{FF2B5EF4-FFF2-40B4-BE49-F238E27FC236}">
-                <a16:creationId xmlns:a16="http://schemas.microsoft.com/office/drawing/2014/main" id="{D623483B-153A-4B49-B72D-06B362115E97}"/>
-              </a:ext>
-            </a:extLst>
-          </p:cNvPr>
+          <p:cNvPr id="7" name="Slide Number Placeholder 6"/>
           <p:cNvSpPr>
             <a:spLocks noGrp="1"/>
           </p:cNvSpPr>
@@ -2441,7 +2149,7 @@
     </p:spTree>
     <p:extLst>
       <p:ext uri="{BB962C8B-B14F-4D97-AF65-F5344CB8AC3E}">
-        <p14:creationId xmlns:p14="http://schemas.microsoft.com/office/powerpoint/2010/main" val="2231959704"/>
+        <p14:creationId xmlns:p14="http://schemas.microsoft.com/office/powerpoint/2010/main" val="2098915317"/>
       </p:ext>
     </p:extLst>
   </p:cSld>
@@ -2470,13 +2178,7 @@
       </p:grpSpPr>
       <p:sp>
         <p:nvSpPr>
-          <p:cNvPr id="2" name="Title 1">
-            <a:extLst>
-              <a:ext uri="{FF2B5EF4-FFF2-40B4-BE49-F238E27FC236}">
-                <a16:creationId xmlns:a16="http://schemas.microsoft.com/office/drawing/2014/main" id="{214F5F19-51F8-B64E-B483-E4D3C62DF116}"/>
-              </a:ext>
-            </a:extLst>
-          </p:cNvPr>
+          <p:cNvPr id="2" name="Title 1"/>
           <p:cNvSpPr>
             <a:spLocks noGrp="1"/>
           </p:cNvSpPr>
@@ -2486,15 +2188,15 @@
         </p:nvSpPr>
         <p:spPr>
           <a:xfrm>
-            <a:off x="839788" y="457200"/>
-            <a:ext cx="3932237" cy="1600200"/>
+            <a:off x="472381" y="812588"/>
+            <a:ext cx="2211884" cy="2844059"/>
           </a:xfrm>
         </p:spPr>
         <p:txBody>
           <a:bodyPr anchor="b"/>
           <a:lstStyle>
             <a:lvl1pPr>
-              <a:defRPr sz="3200"/>
+              <a:defRPr sz="2400"/>
             </a:lvl1pPr>
           </a:lstStyle>
           <a:p>
@@ -2502,20 +2204,15 @@
               <a:rPr lang="en-US"/>
               <a:t>Click to edit Master title style</a:t>
             </a:r>
-          </a:p>
-        </p:txBody>
-      </p:sp>
-      <p:sp>
-        <p:nvSpPr>
-          <p:cNvPr id="3" name="Picture Placeholder 2">
-            <a:extLst>
-              <a:ext uri="{FF2B5EF4-FFF2-40B4-BE49-F238E27FC236}">
-                <a16:creationId xmlns:a16="http://schemas.microsoft.com/office/drawing/2014/main" id="{EA4733A8-0346-9548-9DE0-3976444B3AF0}"/>
-              </a:ext>
-            </a:extLst>
-          </p:cNvPr>
-          <p:cNvSpPr>
-            <a:spLocks noGrp="1"/>
+            <a:endParaRPr lang="en-US" dirty="0"/>
+          </a:p>
+        </p:txBody>
+      </p:sp>
+      <p:sp>
+        <p:nvSpPr>
+          <p:cNvPr id="3" name="Picture Placeholder 2"/>
+          <p:cNvSpPr>
+            <a:spLocks noGrp="1" noChangeAspect="1"/>
           </p:cNvSpPr>
           <p:nvPr>
             <p:ph type="pic" idx="1"/>
@@ -2523,64 +2220,62 @@
         </p:nvSpPr>
         <p:spPr>
           <a:xfrm>
-            <a:off x="5183188" y="987425"/>
-            <a:ext cx="6172200" cy="4873625"/>
+            <a:off x="2915543" y="1754968"/>
+            <a:ext cx="3471863" cy="8661966"/>
           </a:xfrm>
         </p:spPr>
         <p:txBody>
-          <a:bodyPr/>
+          <a:bodyPr anchor="t"/>
           <a:lstStyle>
             <a:lvl1pPr marL="0" indent="0">
               <a:buNone/>
-              <a:defRPr sz="3200"/>
+              <a:defRPr sz="2400"/>
             </a:lvl1pPr>
-            <a:lvl2pPr marL="457200" indent="0">
-              <a:buNone/>
-              <a:defRPr sz="2800"/>
+            <a:lvl2pPr marL="342900" indent="0">
+              <a:buNone/>
+              <a:defRPr sz="2100"/>
             </a:lvl2pPr>
-            <a:lvl3pPr marL="914400" indent="0">
-              <a:buNone/>
-              <a:defRPr sz="2400"/>
+            <a:lvl3pPr marL="685800" indent="0">
+              <a:buNone/>
+              <a:defRPr sz="1800"/>
             </a:lvl3pPr>
-            <a:lvl4pPr marL="1371600" indent="0">
-              <a:buNone/>
-              <a:defRPr sz="2000"/>
+            <a:lvl4pPr marL="1028700" indent="0">
+              <a:buNone/>
+              <a:defRPr sz="1500"/>
             </a:lvl4pPr>
-            <a:lvl5pPr marL="1828800" indent="0">
-              <a:buNone/>
-              <a:defRPr sz="2000"/>
+            <a:lvl5pPr marL="1371600" indent="0">
+              <a:buNone/>
+              <a:defRPr sz="1500"/>
             </a:lvl5pPr>
-            <a:lvl6pPr marL="2286000" indent="0">
-              <a:buNone/>
-              <a:defRPr sz="2000"/>
+            <a:lvl6pPr marL="1714500" indent="0">
+              <a:buNone/>
+              <a:defRPr sz="1500"/>
             </a:lvl6pPr>
-            <a:lvl7pPr marL="2743200" indent="0">
-              <a:buNone/>
-              <a:defRPr sz="2000"/>
+            <a:lvl7pPr marL="2057400" indent="0">
+              <a:buNone/>
+              <a:defRPr sz="1500"/>
             </a:lvl7pPr>
-            <a:lvl8pPr marL="3200400" indent="0">
-              <a:buNone/>
-              <a:defRPr sz="2000"/>
+            <a:lvl8pPr marL="2400300" indent="0">
+              <a:buNone/>
+              <a:defRPr sz="1500"/>
             </a:lvl8pPr>
-            <a:lvl9pPr marL="3657600" indent="0">
-              <a:buNone/>
-              <a:defRPr sz="2000"/>
+            <a:lvl9pPr marL="2743200" indent="0">
+              <a:buNone/>
+              <a:defRPr sz="1500"/>
             </a:lvl9pPr>
           </a:lstStyle>
           <a:p>
-            <a:endParaRPr lang="en-US"/>
-          </a:p>
-        </p:txBody>
-      </p:sp>
-      <p:sp>
-        <p:nvSpPr>
-          <p:cNvPr id="4" name="Text Placeholder 3">
-            <a:extLst>
-              <a:ext uri="{FF2B5EF4-FFF2-40B4-BE49-F238E27FC236}">
-                <a16:creationId xmlns:a16="http://schemas.microsoft.com/office/drawing/2014/main" id="{BAF7B5D2-79EA-144A-AB2F-CF0DC4883B23}"/>
-              </a:ext>
-            </a:extLst>
-          </p:cNvPr>
+            <a:r>
+              <a:rPr lang="en-US"/>
+              <a:t>Click icon to add picture</a:t>
+            </a:r>
+            <a:endParaRPr lang="en-US" dirty="0"/>
+          </a:p>
+        </p:txBody>
+      </p:sp>
+      <p:sp>
+        <p:nvSpPr>
+          <p:cNvPr id="4" name="Text Placeholder 3"/>
           <p:cNvSpPr>
             <a:spLocks noGrp="1"/>
           </p:cNvSpPr>
@@ -2590,8 +2285,8 @@
         </p:nvSpPr>
         <p:spPr>
           <a:xfrm>
-            <a:off x="839788" y="2057400"/>
-            <a:ext cx="3932237" cy="3811588"/>
+            <a:off x="472381" y="3656647"/>
+            <a:ext cx="2211884" cy="6774392"/>
           </a:xfrm>
         </p:spPr>
         <p:txBody>
@@ -2599,39 +2294,39 @@
           <a:lstStyle>
             <a:lvl1pPr marL="0" indent="0">
               <a:buNone/>
-              <a:defRPr sz="1600"/>
+              <a:defRPr sz="1200"/>
             </a:lvl1pPr>
-            <a:lvl2pPr marL="457200" indent="0">
-              <a:buNone/>
-              <a:defRPr sz="1400"/>
+            <a:lvl2pPr marL="342900" indent="0">
+              <a:buNone/>
+              <a:defRPr sz="1050"/>
             </a:lvl2pPr>
-            <a:lvl3pPr marL="914400" indent="0">
-              <a:buNone/>
-              <a:defRPr sz="1200"/>
+            <a:lvl3pPr marL="685800" indent="0">
+              <a:buNone/>
+              <a:defRPr sz="900"/>
             </a:lvl3pPr>
-            <a:lvl4pPr marL="1371600" indent="0">
-              <a:buNone/>
-              <a:defRPr sz="1000"/>
+            <a:lvl4pPr marL="1028700" indent="0">
+              <a:buNone/>
+              <a:defRPr sz="750"/>
             </a:lvl4pPr>
-            <a:lvl5pPr marL="1828800" indent="0">
-              <a:buNone/>
-              <a:defRPr sz="1000"/>
+            <a:lvl5pPr marL="1371600" indent="0">
+              <a:buNone/>
+              <a:defRPr sz="750"/>
             </a:lvl5pPr>
-            <a:lvl6pPr marL="2286000" indent="0">
-              <a:buNone/>
-              <a:defRPr sz="1000"/>
+            <a:lvl6pPr marL="1714500" indent="0">
+              <a:buNone/>
+              <a:defRPr sz="750"/>
             </a:lvl6pPr>
-            <a:lvl7pPr marL="2743200" indent="0">
-              <a:buNone/>
-              <a:defRPr sz="1000"/>
+            <a:lvl7pPr marL="2057400" indent="0">
+              <a:buNone/>
+              <a:defRPr sz="750"/>
             </a:lvl7pPr>
-            <a:lvl8pPr marL="3200400" indent="0">
-              <a:buNone/>
-              <a:defRPr sz="1000"/>
+            <a:lvl8pPr marL="2400300" indent="0">
+              <a:buNone/>
+              <a:defRPr sz="750"/>
             </a:lvl8pPr>
-            <a:lvl9pPr marL="3657600" indent="0">
-              <a:buNone/>
-              <a:defRPr sz="1000"/>
+            <a:lvl9pPr marL="2743200" indent="0">
+              <a:buNone/>
+              <a:defRPr sz="750"/>
             </a:lvl9pPr>
           </a:lstStyle>
           <a:p>
@@ -2645,13 +2340,7 @@
       </p:sp>
       <p:sp>
         <p:nvSpPr>
-          <p:cNvPr id="5" name="Date Placeholder 4">
-            <a:extLst>
-              <a:ext uri="{FF2B5EF4-FFF2-40B4-BE49-F238E27FC236}">
-                <a16:creationId xmlns:a16="http://schemas.microsoft.com/office/drawing/2014/main" id="{D40B78F6-CFC4-544F-BB6A-F56C2345656E}"/>
-              </a:ext>
-            </a:extLst>
-          </p:cNvPr>
+          <p:cNvPr id="5" name="Date Placeholder 4"/>
           <p:cNvSpPr>
             <a:spLocks noGrp="1"/>
           </p:cNvSpPr>
@@ -2666,7 +2355,7 @@
           <a:p>
             <a:fld id="{F5C1E949-2315-8048-B2B3-E5DC19E4BEBE}" type="datetimeFigureOut">
               <a:rPr lang="en-US" smtClean="0"/>
-              <a:t>4/11/22</a:t>
+              <a:t>4/20/22</a:t>
             </a:fld>
             <a:endParaRPr lang="en-US"/>
           </a:p>
@@ -2674,13 +2363,7 @@
       </p:sp>
       <p:sp>
         <p:nvSpPr>
-          <p:cNvPr id="6" name="Footer Placeholder 5">
-            <a:extLst>
-              <a:ext uri="{FF2B5EF4-FFF2-40B4-BE49-F238E27FC236}">
-                <a16:creationId xmlns:a16="http://schemas.microsoft.com/office/drawing/2014/main" id="{45BCC996-9CCD-694C-B26E-485009BE1A8A}"/>
-              </a:ext>
-            </a:extLst>
-          </p:cNvPr>
+          <p:cNvPr id="6" name="Footer Placeholder 5"/>
           <p:cNvSpPr>
             <a:spLocks noGrp="1"/>
           </p:cNvSpPr>
@@ -2699,13 +2382,7 @@
       </p:sp>
       <p:sp>
         <p:nvSpPr>
-          <p:cNvPr id="7" name="Slide Number Placeholder 6">
-            <a:extLst>
-              <a:ext uri="{FF2B5EF4-FFF2-40B4-BE49-F238E27FC236}">
-                <a16:creationId xmlns:a16="http://schemas.microsoft.com/office/drawing/2014/main" id="{085A26F3-7798-E54E-8624-933DF4A217B3}"/>
-              </a:ext>
-            </a:extLst>
-          </p:cNvPr>
+          <p:cNvPr id="7" name="Slide Number Placeholder 6"/>
           <p:cNvSpPr>
             <a:spLocks noGrp="1"/>
           </p:cNvSpPr>
@@ -2729,7 +2406,7 @@
     </p:spTree>
     <p:extLst>
       <p:ext uri="{BB962C8B-B14F-4D97-AF65-F5344CB8AC3E}">
-        <p14:creationId xmlns:p14="http://schemas.microsoft.com/office/powerpoint/2010/main" val="428194960"/>
+        <p14:creationId xmlns:p14="http://schemas.microsoft.com/office/powerpoint/2010/main" val="2728725043"/>
       </p:ext>
     </p:extLst>
   </p:cSld>
@@ -2763,13 +2440,7 @@
       </p:grpSpPr>
       <p:sp>
         <p:nvSpPr>
-          <p:cNvPr id="2" name="Title Placeholder 1">
-            <a:extLst>
-              <a:ext uri="{FF2B5EF4-FFF2-40B4-BE49-F238E27FC236}">
-                <a16:creationId xmlns:a16="http://schemas.microsoft.com/office/drawing/2014/main" id="{9537CD58-C5C3-CF4D-9D0A-3DE04F5A1292}"/>
-              </a:ext>
-            </a:extLst>
-          </p:cNvPr>
+          <p:cNvPr id="2" name="Title Placeholder 1"/>
           <p:cNvSpPr>
             <a:spLocks noGrp="1"/>
           </p:cNvSpPr>
@@ -2779,8 +2450,8 @@
         </p:nvSpPr>
         <p:spPr>
           <a:xfrm>
-            <a:off x="838200" y="365125"/>
-            <a:ext cx="10515600" cy="1325563"/>
+            <a:off x="471488" y="648945"/>
+            <a:ext cx="5915025" cy="2355943"/>
           </a:xfrm>
           <a:prstGeom prst="rect">
             <a:avLst/>
@@ -2796,18 +2467,13 @@
               <a:rPr lang="en-US"/>
               <a:t>Click to edit Master title style</a:t>
             </a:r>
-          </a:p>
-        </p:txBody>
-      </p:sp>
-      <p:sp>
-        <p:nvSpPr>
-          <p:cNvPr id="3" name="Text Placeholder 2">
-            <a:extLst>
-              <a:ext uri="{FF2B5EF4-FFF2-40B4-BE49-F238E27FC236}">
-                <a16:creationId xmlns:a16="http://schemas.microsoft.com/office/drawing/2014/main" id="{5363D858-98B3-734C-B2CA-3755EF1051D7}"/>
-              </a:ext>
-            </a:extLst>
-          </p:cNvPr>
+            <a:endParaRPr lang="en-US" dirty="0"/>
+          </a:p>
+        </p:txBody>
+      </p:sp>
+      <p:sp>
+        <p:nvSpPr>
+          <p:cNvPr id="3" name="Text Placeholder 2"/>
           <p:cNvSpPr>
             <a:spLocks noGrp="1"/>
           </p:cNvSpPr>
@@ -2817,8 +2483,8 @@
         </p:nvSpPr>
         <p:spPr>
           <a:xfrm>
-            <a:off x="838200" y="1825625"/>
-            <a:ext cx="10515600" cy="4351338"/>
+            <a:off x="471488" y="3244711"/>
+            <a:ext cx="5915025" cy="7733697"/>
           </a:xfrm>
           <a:prstGeom prst="rect">
             <a:avLst/>
@@ -2863,18 +2529,13 @@
               <a:rPr lang="en-US"/>
               <a:t>Fifth level</a:t>
             </a:r>
-          </a:p>
-        </p:txBody>
-      </p:sp>
-      <p:sp>
-        <p:nvSpPr>
-          <p:cNvPr id="4" name="Date Placeholder 3">
-            <a:extLst>
-              <a:ext uri="{FF2B5EF4-FFF2-40B4-BE49-F238E27FC236}">
-                <a16:creationId xmlns:a16="http://schemas.microsoft.com/office/drawing/2014/main" id="{8D3C5E98-69E0-2546-A27E-69E03F39A85D}"/>
-              </a:ext>
-            </a:extLst>
-          </p:cNvPr>
+            <a:endParaRPr lang="en-US" dirty="0"/>
+          </a:p>
+        </p:txBody>
+      </p:sp>
+      <p:sp>
+        <p:nvSpPr>
+          <p:cNvPr id="4" name="Date Placeholder 3"/>
           <p:cNvSpPr>
             <a:spLocks noGrp="1"/>
           </p:cNvSpPr>
@@ -2884,8 +2545,8 @@
         </p:nvSpPr>
         <p:spPr>
           <a:xfrm>
-            <a:off x="838200" y="6356350"/>
-            <a:ext cx="2743200" cy="365125"/>
+            <a:off x="471488" y="11297238"/>
+            <a:ext cx="1543050" cy="648942"/>
           </a:xfrm>
           <a:prstGeom prst="rect">
             <a:avLst/>
@@ -2895,7 +2556,7 @@
           <a:bodyPr vert="horz" lIns="91440" tIns="45720" rIns="91440" bIns="45720" rtlCol="0" anchor="ctr"/>
           <a:lstStyle>
             <a:lvl1pPr algn="l">
-              <a:defRPr sz="1200">
+              <a:defRPr sz="900">
                 <a:solidFill>
                   <a:schemeClr val="tx1">
                     <a:tint val="75000"/>
@@ -2907,7 +2568,7 @@
           <a:p>
             <a:fld id="{F5C1E949-2315-8048-B2B3-E5DC19E4BEBE}" type="datetimeFigureOut">
               <a:rPr lang="en-US" smtClean="0"/>
-              <a:t>4/11/22</a:t>
+              <a:t>4/20/22</a:t>
             </a:fld>
             <a:endParaRPr lang="en-US"/>
           </a:p>
@@ -2915,13 +2576,7 @@
       </p:sp>
       <p:sp>
         <p:nvSpPr>
-          <p:cNvPr id="5" name="Footer Placeholder 4">
-            <a:extLst>
-              <a:ext uri="{FF2B5EF4-FFF2-40B4-BE49-F238E27FC236}">
-                <a16:creationId xmlns:a16="http://schemas.microsoft.com/office/drawing/2014/main" id="{CF45073E-6F37-DA48-8A39-85B10EADF4A4}"/>
-              </a:ext>
-            </a:extLst>
-          </p:cNvPr>
+          <p:cNvPr id="5" name="Footer Placeholder 4"/>
           <p:cNvSpPr>
             <a:spLocks noGrp="1"/>
           </p:cNvSpPr>
@@ -2931,8 +2586,8 @@
         </p:nvSpPr>
         <p:spPr>
           <a:xfrm>
-            <a:off x="4038600" y="6356350"/>
-            <a:ext cx="4114800" cy="365125"/>
+            <a:off x="2271713" y="11297238"/>
+            <a:ext cx="2314575" cy="648942"/>
           </a:xfrm>
           <a:prstGeom prst="rect">
             <a:avLst/>
@@ -2942,7 +2597,7 @@
           <a:bodyPr vert="horz" lIns="91440" tIns="45720" rIns="91440" bIns="45720" rtlCol="0" anchor="ctr"/>
           <a:lstStyle>
             <a:lvl1pPr algn="ctr">
-              <a:defRPr sz="1200">
+              <a:defRPr sz="900">
                 <a:solidFill>
                   <a:schemeClr val="tx1">
                     <a:tint val="75000"/>
@@ -2958,13 +2613,7 @@
       </p:sp>
       <p:sp>
         <p:nvSpPr>
-          <p:cNvPr id="6" name="Slide Number Placeholder 5">
-            <a:extLst>
-              <a:ext uri="{FF2B5EF4-FFF2-40B4-BE49-F238E27FC236}">
-                <a16:creationId xmlns:a16="http://schemas.microsoft.com/office/drawing/2014/main" id="{F47AF2A9-BB89-DC44-A286-02368884A094}"/>
-              </a:ext>
-            </a:extLst>
-          </p:cNvPr>
+          <p:cNvPr id="6" name="Slide Number Placeholder 5"/>
           <p:cNvSpPr>
             <a:spLocks noGrp="1"/>
           </p:cNvSpPr>
@@ -2974,8 +2623,8 @@
         </p:nvSpPr>
         <p:spPr>
           <a:xfrm>
-            <a:off x="8610600" y="6356350"/>
-            <a:ext cx="2743200" cy="365125"/>
+            <a:off x="4843463" y="11297238"/>
+            <a:ext cx="1543050" cy="648942"/>
           </a:xfrm>
           <a:prstGeom prst="rect">
             <a:avLst/>
@@ -2985,7 +2634,7 @@
           <a:bodyPr vert="horz" lIns="91440" tIns="45720" rIns="91440" bIns="45720" rtlCol="0" anchor="ctr"/>
           <a:lstStyle>
             <a:lvl1pPr algn="r">
-              <a:defRPr sz="1200">
+              <a:defRPr sz="900">
                 <a:solidFill>
                   <a:schemeClr val="tx1">
                     <a:tint val="75000"/>
@@ -3006,27 +2655,27 @@
     </p:spTree>
     <p:extLst>
       <p:ext uri="{BB962C8B-B14F-4D97-AF65-F5344CB8AC3E}">
-        <p14:creationId xmlns:p14="http://schemas.microsoft.com/office/powerpoint/2010/main" val="1280322604"/>
+        <p14:creationId xmlns:p14="http://schemas.microsoft.com/office/powerpoint/2010/main" val="1852302412"/>
       </p:ext>
     </p:extLst>
   </p:cSld>
   <p:clrMap bg1="lt1" tx1="dk1" bg2="lt2" tx2="dk2" accent1="accent1" accent2="accent2" accent3="accent3" accent4="accent4" accent5="accent5" accent6="accent6" hlink="hlink" folHlink="folHlink"/>
   <p:sldLayoutIdLst>
-    <p:sldLayoutId id="2147483649" r:id="rId1"/>
-    <p:sldLayoutId id="2147483650" r:id="rId2"/>
-    <p:sldLayoutId id="2147483651" r:id="rId3"/>
-    <p:sldLayoutId id="2147483652" r:id="rId4"/>
-    <p:sldLayoutId id="2147483653" r:id="rId5"/>
-    <p:sldLayoutId id="2147483654" r:id="rId6"/>
-    <p:sldLayoutId id="2147483655" r:id="rId7"/>
-    <p:sldLayoutId id="2147483656" r:id="rId8"/>
-    <p:sldLayoutId id="2147483657" r:id="rId9"/>
-    <p:sldLayoutId id="2147483658" r:id="rId10"/>
-    <p:sldLayoutId id="2147483659" r:id="rId11"/>
+    <p:sldLayoutId id="2147483661" r:id="rId1"/>
+    <p:sldLayoutId id="2147483662" r:id="rId2"/>
+    <p:sldLayoutId id="2147483663" r:id="rId3"/>
+    <p:sldLayoutId id="2147483664" r:id="rId4"/>
+    <p:sldLayoutId id="2147483665" r:id="rId5"/>
+    <p:sldLayoutId id="2147483666" r:id="rId6"/>
+    <p:sldLayoutId id="2147483667" r:id="rId7"/>
+    <p:sldLayoutId id="2147483668" r:id="rId8"/>
+    <p:sldLayoutId id="2147483669" r:id="rId9"/>
+    <p:sldLayoutId id="2147483670" r:id="rId10"/>
+    <p:sldLayoutId id="2147483671" r:id="rId11"/>
   </p:sldLayoutIdLst>
   <p:txStyles>
     <p:titleStyle>
-      <a:lvl1pPr algn="l" defTabSz="914400" rtl="0" eaLnBrk="1" latinLnBrk="0" hangingPunct="1">
+      <a:lvl1pPr algn="l" defTabSz="685800" rtl="0" eaLnBrk="1" latinLnBrk="0" hangingPunct="1">
         <a:lnSpc>
           <a:spcPct val="90000"/>
         </a:lnSpc>
@@ -3034,7 +2683,7 @@
           <a:spcPct val="0"/>
         </a:spcBef>
         <a:buNone/>
-        <a:defRPr sz="4400" kern="1200">
+        <a:defRPr sz="3300" kern="1200">
           <a:solidFill>
             <a:schemeClr val="tx1"/>
           </a:solidFill>
@@ -3045,16 +2694,16 @@
       </a:lvl1pPr>
     </p:titleStyle>
     <p:bodyStyle>
-      <a:lvl1pPr marL="228600" indent="-228600" algn="l" defTabSz="914400" rtl="0" eaLnBrk="1" latinLnBrk="0" hangingPunct="1">
+      <a:lvl1pPr marL="171450" indent="-171450" algn="l" defTabSz="685800" rtl="0" eaLnBrk="1" latinLnBrk="0" hangingPunct="1">
         <a:lnSpc>
           <a:spcPct val="90000"/>
         </a:lnSpc>
         <a:spcBef>
-          <a:spcPts val="1000"/>
+          <a:spcPts val="750"/>
         </a:spcBef>
         <a:buFont typeface="Arial" panose="020B0604020202020204" pitchFamily="34" charset="0"/>
         <a:buChar char="•"/>
-        <a:defRPr sz="2800" kern="1200">
+        <a:defRPr sz="2100" kern="1200">
           <a:solidFill>
             <a:schemeClr val="tx1"/>
           </a:solidFill>
@@ -3063,48 +2712,12 @@
           <a:cs typeface="+mn-cs"/>
         </a:defRPr>
       </a:lvl1pPr>
-      <a:lvl2pPr marL="685800" indent="-228600" algn="l" defTabSz="914400" rtl="0" eaLnBrk="1" latinLnBrk="0" hangingPunct="1">
+      <a:lvl2pPr marL="514350" indent="-171450" algn="l" defTabSz="685800" rtl="0" eaLnBrk="1" latinLnBrk="0" hangingPunct="1">
         <a:lnSpc>
           <a:spcPct val="90000"/>
         </a:lnSpc>
         <a:spcBef>
-          <a:spcPts val="500"/>
-        </a:spcBef>
-        <a:buFont typeface="Arial" panose="020B0604020202020204" pitchFamily="34" charset="0"/>
-        <a:buChar char="•"/>
-        <a:defRPr sz="2400" kern="1200">
-          <a:solidFill>
-            <a:schemeClr val="tx1"/>
-          </a:solidFill>
-          <a:latin typeface="+mn-lt"/>
-          <a:ea typeface="+mn-ea"/>
-          <a:cs typeface="+mn-cs"/>
-        </a:defRPr>
-      </a:lvl2pPr>
-      <a:lvl3pPr marL="1143000" indent="-228600" algn="l" defTabSz="914400" rtl="0" eaLnBrk="1" latinLnBrk="0" hangingPunct="1">
-        <a:lnSpc>
-          <a:spcPct val="90000"/>
-        </a:lnSpc>
-        <a:spcBef>
-          <a:spcPts val="500"/>
-        </a:spcBef>
-        <a:buFont typeface="Arial" panose="020B0604020202020204" pitchFamily="34" charset="0"/>
-        <a:buChar char="•"/>
-        <a:defRPr sz="2000" kern="1200">
-          <a:solidFill>
-            <a:schemeClr val="tx1"/>
-          </a:solidFill>
-          <a:latin typeface="+mn-lt"/>
-          <a:ea typeface="+mn-ea"/>
-          <a:cs typeface="+mn-cs"/>
-        </a:defRPr>
-      </a:lvl3pPr>
-      <a:lvl4pPr marL="1600200" indent="-228600" algn="l" defTabSz="914400" rtl="0" eaLnBrk="1" latinLnBrk="0" hangingPunct="1">
-        <a:lnSpc>
-          <a:spcPct val="90000"/>
-        </a:lnSpc>
-        <a:spcBef>
-          <a:spcPts val="500"/>
+          <a:spcPts val="375"/>
         </a:spcBef>
         <a:buFont typeface="Arial" panose="020B0604020202020204" pitchFamily="34" charset="0"/>
         <a:buChar char="•"/>
@@ -3116,17 +2729,53 @@
           <a:ea typeface="+mn-ea"/>
           <a:cs typeface="+mn-cs"/>
         </a:defRPr>
-      </a:lvl4pPr>
-      <a:lvl5pPr marL="2057400" indent="-228600" algn="l" defTabSz="914400" rtl="0" eaLnBrk="1" latinLnBrk="0" hangingPunct="1">
+      </a:lvl2pPr>
+      <a:lvl3pPr marL="857250" indent="-171450" algn="l" defTabSz="685800" rtl="0" eaLnBrk="1" latinLnBrk="0" hangingPunct="1">
         <a:lnSpc>
           <a:spcPct val="90000"/>
         </a:lnSpc>
         <a:spcBef>
-          <a:spcPts val="500"/>
+          <a:spcPts val="375"/>
         </a:spcBef>
         <a:buFont typeface="Arial" panose="020B0604020202020204" pitchFamily="34" charset="0"/>
         <a:buChar char="•"/>
-        <a:defRPr sz="1800" kern="1200">
+        <a:defRPr sz="1500" kern="1200">
+          <a:solidFill>
+            <a:schemeClr val="tx1"/>
+          </a:solidFill>
+          <a:latin typeface="+mn-lt"/>
+          <a:ea typeface="+mn-ea"/>
+          <a:cs typeface="+mn-cs"/>
+        </a:defRPr>
+      </a:lvl3pPr>
+      <a:lvl4pPr marL="1200150" indent="-171450" algn="l" defTabSz="685800" rtl="0" eaLnBrk="1" latinLnBrk="0" hangingPunct="1">
+        <a:lnSpc>
+          <a:spcPct val="90000"/>
+        </a:lnSpc>
+        <a:spcBef>
+          <a:spcPts val="375"/>
+        </a:spcBef>
+        <a:buFont typeface="Arial" panose="020B0604020202020204" pitchFamily="34" charset="0"/>
+        <a:buChar char="•"/>
+        <a:defRPr sz="1350" kern="1200">
+          <a:solidFill>
+            <a:schemeClr val="tx1"/>
+          </a:solidFill>
+          <a:latin typeface="+mn-lt"/>
+          <a:ea typeface="+mn-ea"/>
+          <a:cs typeface="+mn-cs"/>
+        </a:defRPr>
+      </a:lvl4pPr>
+      <a:lvl5pPr marL="1543050" indent="-171450" algn="l" defTabSz="685800" rtl="0" eaLnBrk="1" latinLnBrk="0" hangingPunct="1">
+        <a:lnSpc>
+          <a:spcPct val="90000"/>
+        </a:lnSpc>
+        <a:spcBef>
+          <a:spcPts val="375"/>
+        </a:spcBef>
+        <a:buFont typeface="Arial" panose="020B0604020202020204" pitchFamily="34" charset="0"/>
+        <a:buChar char="•"/>
+        <a:defRPr sz="1350" kern="1200">
           <a:solidFill>
             <a:schemeClr val="tx1"/>
           </a:solidFill>
@@ -3135,16 +2784,16 @@
           <a:cs typeface="+mn-cs"/>
         </a:defRPr>
       </a:lvl5pPr>
-      <a:lvl6pPr marL="2514600" indent="-228600" algn="l" defTabSz="914400" rtl="0" eaLnBrk="1" latinLnBrk="0" hangingPunct="1">
+      <a:lvl6pPr marL="1885950" indent="-171450" algn="l" defTabSz="685800" rtl="0" eaLnBrk="1" latinLnBrk="0" hangingPunct="1">
         <a:lnSpc>
           <a:spcPct val="90000"/>
         </a:lnSpc>
         <a:spcBef>
-          <a:spcPts val="500"/>
+          <a:spcPts val="375"/>
         </a:spcBef>
         <a:buFont typeface="Arial" panose="020B0604020202020204" pitchFamily="34" charset="0"/>
         <a:buChar char="•"/>
-        <a:defRPr sz="1800" kern="1200">
+        <a:defRPr sz="1350" kern="1200">
           <a:solidFill>
             <a:schemeClr val="tx1"/>
           </a:solidFill>
@@ -3153,16 +2802,16 @@
           <a:cs typeface="+mn-cs"/>
         </a:defRPr>
       </a:lvl6pPr>
-      <a:lvl7pPr marL="2971800" indent="-228600" algn="l" defTabSz="914400" rtl="0" eaLnBrk="1" latinLnBrk="0" hangingPunct="1">
+      <a:lvl7pPr marL="2228850" indent="-171450" algn="l" defTabSz="685800" rtl="0" eaLnBrk="1" latinLnBrk="0" hangingPunct="1">
         <a:lnSpc>
           <a:spcPct val="90000"/>
         </a:lnSpc>
         <a:spcBef>
-          <a:spcPts val="500"/>
+          <a:spcPts val="375"/>
         </a:spcBef>
         <a:buFont typeface="Arial" panose="020B0604020202020204" pitchFamily="34" charset="0"/>
         <a:buChar char="•"/>
-        <a:defRPr sz="1800" kern="1200">
+        <a:defRPr sz="1350" kern="1200">
           <a:solidFill>
             <a:schemeClr val="tx1"/>
           </a:solidFill>
@@ -3171,16 +2820,16 @@
           <a:cs typeface="+mn-cs"/>
         </a:defRPr>
       </a:lvl7pPr>
-      <a:lvl8pPr marL="3429000" indent="-228600" algn="l" defTabSz="914400" rtl="0" eaLnBrk="1" latinLnBrk="0" hangingPunct="1">
+      <a:lvl8pPr marL="2571750" indent="-171450" algn="l" defTabSz="685800" rtl="0" eaLnBrk="1" latinLnBrk="0" hangingPunct="1">
         <a:lnSpc>
           <a:spcPct val="90000"/>
         </a:lnSpc>
         <a:spcBef>
-          <a:spcPts val="500"/>
+          <a:spcPts val="375"/>
         </a:spcBef>
         <a:buFont typeface="Arial" panose="020B0604020202020204" pitchFamily="34" charset="0"/>
         <a:buChar char="•"/>
-        <a:defRPr sz="1800" kern="1200">
+        <a:defRPr sz="1350" kern="1200">
           <a:solidFill>
             <a:schemeClr val="tx1"/>
           </a:solidFill>
@@ -3189,16 +2838,16 @@
           <a:cs typeface="+mn-cs"/>
         </a:defRPr>
       </a:lvl8pPr>
-      <a:lvl9pPr marL="3886200" indent="-228600" algn="l" defTabSz="914400" rtl="0" eaLnBrk="1" latinLnBrk="0" hangingPunct="1">
+      <a:lvl9pPr marL="2914650" indent="-171450" algn="l" defTabSz="685800" rtl="0" eaLnBrk="1" latinLnBrk="0" hangingPunct="1">
         <a:lnSpc>
           <a:spcPct val="90000"/>
         </a:lnSpc>
         <a:spcBef>
-          <a:spcPts val="500"/>
+          <a:spcPts val="375"/>
         </a:spcBef>
         <a:buFont typeface="Arial" panose="020B0604020202020204" pitchFamily="34" charset="0"/>
         <a:buChar char="•"/>
-        <a:defRPr sz="1800" kern="1200">
+        <a:defRPr sz="1350" kern="1200">
           <a:solidFill>
             <a:schemeClr val="tx1"/>
           </a:solidFill>
@@ -3212,8 +2861,8 @@
       <a:defPPr>
         <a:defRPr lang="en-US"/>
       </a:defPPr>
-      <a:lvl1pPr marL="0" algn="l" defTabSz="914400" rtl="0" eaLnBrk="1" latinLnBrk="0" hangingPunct="1">
-        <a:defRPr sz="1800" kern="1200">
+      <a:lvl1pPr marL="0" algn="l" defTabSz="685800" rtl="0" eaLnBrk="1" latinLnBrk="0" hangingPunct="1">
+        <a:defRPr sz="1350" kern="1200">
           <a:solidFill>
             <a:schemeClr val="tx1"/>
           </a:solidFill>
@@ -3222,8 +2871,8 @@
           <a:cs typeface="+mn-cs"/>
         </a:defRPr>
       </a:lvl1pPr>
-      <a:lvl2pPr marL="457200" algn="l" defTabSz="914400" rtl="0" eaLnBrk="1" latinLnBrk="0" hangingPunct="1">
-        <a:defRPr sz="1800" kern="1200">
+      <a:lvl2pPr marL="342900" algn="l" defTabSz="685800" rtl="0" eaLnBrk="1" latinLnBrk="0" hangingPunct="1">
+        <a:defRPr sz="1350" kern="1200">
           <a:solidFill>
             <a:schemeClr val="tx1"/>
           </a:solidFill>
@@ -3232,8 +2881,8 @@
           <a:cs typeface="+mn-cs"/>
         </a:defRPr>
       </a:lvl2pPr>
-      <a:lvl3pPr marL="914400" algn="l" defTabSz="914400" rtl="0" eaLnBrk="1" latinLnBrk="0" hangingPunct="1">
-        <a:defRPr sz="1800" kern="1200">
+      <a:lvl3pPr marL="685800" algn="l" defTabSz="685800" rtl="0" eaLnBrk="1" latinLnBrk="0" hangingPunct="1">
+        <a:defRPr sz="1350" kern="1200">
           <a:solidFill>
             <a:schemeClr val="tx1"/>
           </a:solidFill>
@@ -3242,8 +2891,8 @@
           <a:cs typeface="+mn-cs"/>
         </a:defRPr>
       </a:lvl3pPr>
-      <a:lvl4pPr marL="1371600" algn="l" defTabSz="914400" rtl="0" eaLnBrk="1" latinLnBrk="0" hangingPunct="1">
-        <a:defRPr sz="1800" kern="1200">
+      <a:lvl4pPr marL="1028700" algn="l" defTabSz="685800" rtl="0" eaLnBrk="1" latinLnBrk="0" hangingPunct="1">
+        <a:defRPr sz="1350" kern="1200">
           <a:solidFill>
             <a:schemeClr val="tx1"/>
           </a:solidFill>
@@ -3252,8 +2901,8 @@
           <a:cs typeface="+mn-cs"/>
         </a:defRPr>
       </a:lvl4pPr>
-      <a:lvl5pPr marL="1828800" algn="l" defTabSz="914400" rtl="0" eaLnBrk="1" latinLnBrk="0" hangingPunct="1">
-        <a:defRPr sz="1800" kern="1200">
+      <a:lvl5pPr marL="1371600" algn="l" defTabSz="685800" rtl="0" eaLnBrk="1" latinLnBrk="0" hangingPunct="1">
+        <a:defRPr sz="1350" kern="1200">
           <a:solidFill>
             <a:schemeClr val="tx1"/>
           </a:solidFill>
@@ -3262,8 +2911,8 @@
           <a:cs typeface="+mn-cs"/>
         </a:defRPr>
       </a:lvl5pPr>
-      <a:lvl6pPr marL="2286000" algn="l" defTabSz="914400" rtl="0" eaLnBrk="1" latinLnBrk="0" hangingPunct="1">
-        <a:defRPr sz="1800" kern="1200">
+      <a:lvl6pPr marL="1714500" algn="l" defTabSz="685800" rtl="0" eaLnBrk="1" latinLnBrk="0" hangingPunct="1">
+        <a:defRPr sz="1350" kern="1200">
           <a:solidFill>
             <a:schemeClr val="tx1"/>
           </a:solidFill>
@@ -3272,8 +2921,8 @@
           <a:cs typeface="+mn-cs"/>
         </a:defRPr>
       </a:lvl6pPr>
-      <a:lvl7pPr marL="2743200" algn="l" defTabSz="914400" rtl="0" eaLnBrk="1" latinLnBrk="0" hangingPunct="1">
-        <a:defRPr sz="1800" kern="1200">
+      <a:lvl7pPr marL="2057400" algn="l" defTabSz="685800" rtl="0" eaLnBrk="1" latinLnBrk="0" hangingPunct="1">
+        <a:defRPr sz="1350" kern="1200">
           <a:solidFill>
             <a:schemeClr val="tx1"/>
           </a:solidFill>
@@ -3282,8 +2931,8 @@
           <a:cs typeface="+mn-cs"/>
         </a:defRPr>
       </a:lvl7pPr>
-      <a:lvl8pPr marL="3200400" algn="l" defTabSz="914400" rtl="0" eaLnBrk="1" latinLnBrk="0" hangingPunct="1">
-        <a:defRPr sz="1800" kern="1200">
+      <a:lvl8pPr marL="2400300" algn="l" defTabSz="685800" rtl="0" eaLnBrk="1" latinLnBrk="0" hangingPunct="1">
+        <a:defRPr sz="1350" kern="1200">
           <a:solidFill>
             <a:schemeClr val="tx1"/>
           </a:solidFill>
@@ -3292,8 +2941,8 @@
           <a:cs typeface="+mn-cs"/>
         </a:defRPr>
       </a:lvl8pPr>
-      <a:lvl9pPr marL="3657600" algn="l" defTabSz="914400" rtl="0" eaLnBrk="1" latinLnBrk="0" hangingPunct="1">
-        <a:defRPr sz="1800" kern="1200">
+      <a:lvl9pPr marL="2743200" algn="l" defTabSz="685800" rtl="0" eaLnBrk="1" latinLnBrk="0" hangingPunct="1">
+        <a:defRPr sz="1350" kern="1200">
           <a:solidFill>
             <a:schemeClr val="tx1"/>
           </a:solidFill>
@@ -3340,8 +2989,8 @@
         </p:nvCxnSpPr>
         <p:spPr>
           <a:xfrm>
-            <a:off x="5141843" y="4631634"/>
-            <a:ext cx="3833255" cy="0"/>
+            <a:off x="1156879" y="9114229"/>
+            <a:ext cx="5176029" cy="1"/>
           </a:xfrm>
           <a:prstGeom prst="line">
             <a:avLst/>
@@ -3377,8 +3026,8 @@
         </p:nvGrpSpPr>
         <p:grpSpPr>
           <a:xfrm rot="4500000">
-            <a:off x="4724503" y="628983"/>
-            <a:ext cx="3629472" cy="3996343"/>
+            <a:off x="741596" y="3312032"/>
+            <a:ext cx="4900861" cy="5396246"/>
             <a:chOff x="1787418" y="761187"/>
             <a:chExt cx="3629472" cy="3996343"/>
           </a:xfrm>
@@ -3467,7 +3116,7 @@
             <a:lstStyle/>
             <a:p>
               <a:pPr algn="ctr"/>
-              <a:endParaRPr lang="en-US"/>
+              <a:endParaRPr lang="en-US" sz="3199"/>
             </a:p>
           </p:txBody>
         </p:sp>
@@ -3486,8 +3135,8 @@
         </p:nvSpPr>
         <p:spPr>
           <a:xfrm>
-            <a:off x="4770848" y="4104861"/>
-            <a:ext cx="1027040" cy="1027040"/>
+            <a:off x="525092" y="8353045"/>
+            <a:ext cx="1522369" cy="1522369"/>
           </a:xfrm>
           <a:prstGeom prst="ellipse">
             <a:avLst/>
@@ -3517,7 +3166,7 @@
           <a:lstStyle/>
           <a:p>
             <a:pPr algn="ctr"/>
-            <a:endParaRPr lang="en-US"/>
+            <a:endParaRPr lang="en-US" sz="3199"/>
           </a:p>
         </p:txBody>
       </p:sp>
@@ -3553,10 +3202,10 @@
       </p:grpSpPr>
       <p:cxnSp>
         <p:nvCxnSpPr>
-          <p:cNvPr id="5" name="Straight Connector 4">
+          <p:cNvPr id="3" name="Straight Connector 2">
             <a:extLst>
               <a:ext uri="{FF2B5EF4-FFF2-40B4-BE49-F238E27FC236}">
-                <a16:creationId xmlns:a16="http://schemas.microsoft.com/office/drawing/2014/main" id="{E3D01841-0740-9B42-B0B5-CE048D001DA4}"/>
+                <a16:creationId xmlns:a16="http://schemas.microsoft.com/office/drawing/2014/main" id="{4F9DD263-B324-FC4C-96F0-16F3EB950EC8}"/>
               </a:ext>
             </a:extLst>
           </p:cNvPr>
@@ -3566,9 +3215,9 @@
           <p:nvPr/>
         </p:nvCxnSpPr>
         <p:spPr>
-          <a:xfrm>
-            <a:off x="5141843" y="4631634"/>
-            <a:ext cx="3833255" cy="0"/>
+          <a:xfrm rot="18779476">
+            <a:off x="975082" y="5936593"/>
+            <a:ext cx="2284399" cy="2458902"/>
           </a:xfrm>
           <a:prstGeom prst="line">
             <a:avLst/>
@@ -3590,121 +3239,12 @@
           </a:fontRef>
         </p:style>
       </p:cxnSp>
-      <p:grpSp>
-        <p:nvGrpSpPr>
-          <p:cNvPr id="2" name="Group 1">
+      <p:sp>
+        <p:nvSpPr>
+          <p:cNvPr id="7" name="Oval 6">
             <a:extLst>
               <a:ext uri="{FF2B5EF4-FFF2-40B4-BE49-F238E27FC236}">
-                <a16:creationId xmlns:a16="http://schemas.microsoft.com/office/drawing/2014/main" id="{646C5D08-0BE5-EE4D-9C7C-4DAD906F8DC9}"/>
-              </a:ext>
-            </a:extLst>
-          </p:cNvPr>
-          <p:cNvGrpSpPr/>
-          <p:nvPr/>
-        </p:nvGrpSpPr>
-        <p:grpSpPr>
-          <a:xfrm rot="2700000">
-            <a:off x="3589766" y="133224"/>
-            <a:ext cx="3629472" cy="3996343"/>
-            <a:chOff x="1787418" y="761187"/>
-            <a:chExt cx="3629472" cy="3996343"/>
-          </a:xfrm>
-        </p:grpSpPr>
-        <p:cxnSp>
-          <p:nvCxnSpPr>
-            <p:cNvPr id="3" name="Straight Connector 2">
-              <a:extLst>
-                <a:ext uri="{FF2B5EF4-FFF2-40B4-BE49-F238E27FC236}">
-                  <a16:creationId xmlns:a16="http://schemas.microsoft.com/office/drawing/2014/main" id="{4F9DD263-B324-FC4C-96F0-16F3EB950EC8}"/>
-                </a:ext>
-              </a:extLst>
-            </p:cNvPr>
-            <p:cNvCxnSpPr>
-              <a:cxnSpLocks/>
-            </p:cNvCxnSpPr>
-            <p:nvPr/>
-          </p:nvCxnSpPr>
-          <p:spPr>
-            <a:xfrm>
-              <a:off x="2425148" y="1537252"/>
-              <a:ext cx="2991742" cy="3220278"/>
-            </a:xfrm>
-            <a:prstGeom prst="line">
-              <a:avLst/>
-            </a:prstGeom>
-            <a:ln w="635000"/>
-          </p:spPr>
-          <p:style>
-            <a:lnRef idx="1">
-              <a:schemeClr val="accent1"/>
-            </a:lnRef>
-            <a:fillRef idx="0">
-              <a:schemeClr val="accent1"/>
-            </a:fillRef>
-            <a:effectRef idx="0">
-              <a:schemeClr val="accent1"/>
-            </a:effectRef>
-            <a:fontRef idx="minor">
-              <a:schemeClr val="tx1"/>
-            </a:fontRef>
-          </p:style>
-        </p:cxnSp>
-        <p:sp>
-          <p:nvSpPr>
-            <p:cNvPr id="7" name="Oval 6">
-              <a:extLst>
-                <a:ext uri="{FF2B5EF4-FFF2-40B4-BE49-F238E27FC236}">
-                  <a16:creationId xmlns:a16="http://schemas.microsoft.com/office/drawing/2014/main" id="{8B3BB849-564F-FB4C-A931-8AFB5F71517D}"/>
-                </a:ext>
-              </a:extLst>
-            </p:cNvPr>
-            <p:cNvSpPr/>
-            <p:nvPr/>
-          </p:nvSpPr>
-          <p:spPr>
-            <a:xfrm>
-              <a:off x="1787418" y="761187"/>
-              <a:ext cx="1552129" cy="1552129"/>
-            </a:xfrm>
-            <a:prstGeom prst="ellipse">
-              <a:avLst/>
-            </a:prstGeom>
-            <a:ln>
-              <a:noFill/>
-            </a:ln>
-          </p:spPr>
-          <p:style>
-            <a:lnRef idx="2">
-              <a:schemeClr val="accent1">
-                <a:shade val="50000"/>
-              </a:schemeClr>
-            </a:lnRef>
-            <a:fillRef idx="1">
-              <a:schemeClr val="accent1"/>
-            </a:fillRef>
-            <a:effectRef idx="0">
-              <a:schemeClr val="accent1"/>
-            </a:effectRef>
-            <a:fontRef idx="minor">
-              <a:schemeClr val="lt1"/>
-            </a:fontRef>
-          </p:style>
-          <p:txBody>
-            <a:bodyPr rtlCol="0" anchor="ctr"/>
-            <a:lstStyle/>
-            <a:p>
-              <a:pPr algn="ctr"/>
-              <a:endParaRPr lang="en-US"/>
-            </a:p>
-          </p:txBody>
-        </p:sp>
-      </p:grpSp>
-      <p:sp>
-        <p:nvSpPr>
-          <p:cNvPr id="9" name="Oval 8">
-            <a:extLst>
-              <a:ext uri="{FF2B5EF4-FFF2-40B4-BE49-F238E27FC236}">
-                <a16:creationId xmlns:a16="http://schemas.microsoft.com/office/drawing/2014/main" id="{7CEFA7F4-8D4C-5B41-A1D9-5DDE84AD955C}"/>
+                <a16:creationId xmlns:a16="http://schemas.microsoft.com/office/drawing/2014/main" id="{8B3BB849-564F-FB4C-A931-8AFB5F71517D}"/>
               </a:ext>
             </a:extLst>
           </p:cNvPr>
@@ -3712,9 +3252,9 @@
           <p:nvPr/>
         </p:nvSpPr>
         <p:spPr>
-          <a:xfrm>
-            <a:off x="4770848" y="4104861"/>
-            <a:ext cx="1027040" cy="1027040"/>
+          <a:xfrm rot="18779476">
+            <a:off x="221253" y="6445653"/>
+            <a:ext cx="1440783" cy="1440783"/>
           </a:xfrm>
           <a:prstGeom prst="ellipse">
             <a:avLst/>
@@ -3744,14 +3284,102 @@
           <a:lstStyle/>
           <a:p>
             <a:pPr algn="ctr"/>
-            <a:endParaRPr lang="en-US"/>
+            <a:endParaRPr lang="en-US" sz="3199"/>
+          </a:p>
+        </p:txBody>
+      </p:sp>
+      <p:cxnSp>
+        <p:nvCxnSpPr>
+          <p:cNvPr id="5" name="Straight Connector 4">
+            <a:extLst>
+              <a:ext uri="{FF2B5EF4-FFF2-40B4-BE49-F238E27FC236}">
+                <a16:creationId xmlns:a16="http://schemas.microsoft.com/office/drawing/2014/main" id="{E3D01841-0740-9B42-B0B5-CE048D001DA4}"/>
+              </a:ext>
+            </a:extLst>
+          </p:cNvPr>
+          <p:cNvCxnSpPr>
+            <a:cxnSpLocks/>
+          </p:cNvCxnSpPr>
+          <p:nvPr/>
+        </p:nvCxnSpPr>
+        <p:spPr>
+          <a:xfrm>
+            <a:off x="3722251" y="7142100"/>
+            <a:ext cx="2926952" cy="1"/>
+          </a:xfrm>
+          <a:prstGeom prst="line">
+            <a:avLst/>
+          </a:prstGeom>
+          <a:ln w="635000"/>
+        </p:spPr>
+        <p:style>
+          <a:lnRef idx="1">
+            <a:schemeClr val="accent1"/>
+          </a:lnRef>
+          <a:fillRef idx="0">
+            <a:schemeClr val="accent1"/>
+          </a:fillRef>
+          <a:effectRef idx="0">
+            <a:schemeClr val="accent1"/>
+          </a:effectRef>
+          <a:fontRef idx="minor">
+            <a:schemeClr val="tx1"/>
+          </a:fontRef>
+        </p:style>
+      </p:cxnSp>
+      <p:sp>
+        <p:nvSpPr>
+          <p:cNvPr id="9" name="Oval 8">
+            <a:extLst>
+              <a:ext uri="{FF2B5EF4-FFF2-40B4-BE49-F238E27FC236}">
+                <a16:creationId xmlns:a16="http://schemas.microsoft.com/office/drawing/2014/main" id="{7CEFA7F4-8D4C-5B41-A1D9-5DDE84AD955C}"/>
+              </a:ext>
+            </a:extLst>
+          </p:cNvPr>
+          <p:cNvSpPr/>
+          <p:nvPr/>
+        </p:nvSpPr>
+        <p:spPr>
+          <a:xfrm>
+            <a:off x="3311187" y="6657863"/>
+            <a:ext cx="968474" cy="968474"/>
+          </a:xfrm>
+          <a:prstGeom prst="ellipse">
+            <a:avLst/>
+          </a:prstGeom>
+          <a:ln>
+            <a:noFill/>
+          </a:ln>
+        </p:spPr>
+        <p:style>
+          <a:lnRef idx="2">
+            <a:schemeClr val="accent1">
+              <a:shade val="50000"/>
+            </a:schemeClr>
+          </a:lnRef>
+          <a:fillRef idx="1">
+            <a:schemeClr val="accent1"/>
+          </a:fillRef>
+          <a:effectRef idx="0">
+            <a:schemeClr val="accent1"/>
+          </a:effectRef>
+          <a:fontRef idx="minor">
+            <a:schemeClr val="lt1"/>
+          </a:fontRef>
+        </p:style>
+        <p:txBody>
+          <a:bodyPr rtlCol="0" anchor="ctr"/>
+          <a:lstStyle/>
+          <a:p>
+            <a:pPr algn="ctr"/>
+            <a:endParaRPr lang="en-US" sz="3199"/>
           </a:p>
         </p:txBody>
       </p:sp>
     </p:spTree>
     <p:extLst>
       <p:ext uri="{BB962C8B-B14F-4D97-AF65-F5344CB8AC3E}">
-        <p14:creationId xmlns:p14="http://schemas.microsoft.com/office/powerpoint/2010/main" val="720635799"/>
+        <p14:creationId xmlns:p14="http://schemas.microsoft.com/office/powerpoint/2010/main" val="1840479062"/>
       </p:ext>
     </p:extLst>
   </p:cSld>
@@ -3793,9 +3421,9 @@
           <p:nvPr/>
         </p:nvCxnSpPr>
         <p:spPr>
-          <a:xfrm>
-            <a:off x="2425148" y="1537252"/>
-            <a:ext cx="2991742" cy="3220278"/>
+          <a:xfrm rot="18779476">
+            <a:off x="975082" y="5936593"/>
+            <a:ext cx="2284399" cy="2458902"/>
           </a:xfrm>
           <a:prstGeom prst="line">
             <a:avLst/>
@@ -3817,45 +3445,6 @@
           </a:fontRef>
         </p:style>
       </p:cxnSp>
-      <p:cxnSp>
-        <p:nvCxnSpPr>
-          <p:cNvPr id="5" name="Straight Connector 4">
-            <a:extLst>
-              <a:ext uri="{FF2B5EF4-FFF2-40B4-BE49-F238E27FC236}">
-                <a16:creationId xmlns:a16="http://schemas.microsoft.com/office/drawing/2014/main" id="{E3D01841-0740-9B42-B0B5-CE048D001DA4}"/>
-              </a:ext>
-            </a:extLst>
-          </p:cNvPr>
-          <p:cNvCxnSpPr>
-            <a:cxnSpLocks/>
-          </p:cNvCxnSpPr>
-          <p:nvPr/>
-        </p:nvCxnSpPr>
-        <p:spPr>
-          <a:xfrm>
-            <a:off x="5141843" y="4631634"/>
-            <a:ext cx="3833255" cy="0"/>
-          </a:xfrm>
-          <a:prstGeom prst="line">
-            <a:avLst/>
-          </a:prstGeom>
-          <a:ln w="635000"/>
-        </p:spPr>
-        <p:style>
-          <a:lnRef idx="1">
-            <a:schemeClr val="accent1"/>
-          </a:lnRef>
-          <a:fillRef idx="0">
-            <a:schemeClr val="accent1"/>
-          </a:fillRef>
-          <a:effectRef idx="0">
-            <a:schemeClr val="accent1"/>
-          </a:effectRef>
-          <a:fontRef idx="minor">
-            <a:schemeClr val="tx1"/>
-          </a:fontRef>
-        </p:style>
-      </p:cxnSp>
       <p:sp>
         <p:nvSpPr>
           <p:cNvPr id="7" name="Oval 6">
@@ -3869,9 +3458,9 @@
           <p:nvPr/>
         </p:nvSpPr>
         <p:spPr>
-          <a:xfrm>
-            <a:off x="1787418" y="761187"/>
-            <a:ext cx="1552129" cy="1552129"/>
+          <a:xfrm rot="18779476">
+            <a:off x="221253" y="6445653"/>
+            <a:ext cx="1440783" cy="1440783"/>
           </a:xfrm>
           <a:prstGeom prst="ellipse">
             <a:avLst/>
@@ -3901,10 +3490,49 @@
           <a:lstStyle/>
           <a:p>
             <a:pPr algn="ctr"/>
-            <a:endParaRPr lang="en-US"/>
-          </a:p>
-        </p:txBody>
-      </p:sp>
+            <a:endParaRPr lang="en-US" sz="3199"/>
+          </a:p>
+        </p:txBody>
+      </p:sp>
+      <p:cxnSp>
+        <p:nvCxnSpPr>
+          <p:cNvPr id="5" name="Straight Connector 4">
+            <a:extLst>
+              <a:ext uri="{FF2B5EF4-FFF2-40B4-BE49-F238E27FC236}">
+                <a16:creationId xmlns:a16="http://schemas.microsoft.com/office/drawing/2014/main" id="{E3D01841-0740-9B42-B0B5-CE048D001DA4}"/>
+              </a:ext>
+            </a:extLst>
+          </p:cNvPr>
+          <p:cNvCxnSpPr>
+            <a:cxnSpLocks/>
+          </p:cNvCxnSpPr>
+          <p:nvPr/>
+        </p:nvCxnSpPr>
+        <p:spPr>
+          <a:xfrm>
+            <a:off x="3722251" y="7142100"/>
+            <a:ext cx="2926952" cy="1"/>
+          </a:xfrm>
+          <a:prstGeom prst="line">
+            <a:avLst/>
+          </a:prstGeom>
+          <a:ln w="635000"/>
+        </p:spPr>
+        <p:style>
+          <a:lnRef idx="1">
+            <a:schemeClr val="accent1"/>
+          </a:lnRef>
+          <a:fillRef idx="0">
+            <a:schemeClr val="accent1"/>
+          </a:fillRef>
+          <a:effectRef idx="0">
+            <a:schemeClr val="accent1"/>
+          </a:effectRef>
+          <a:fontRef idx="minor">
+            <a:schemeClr val="tx1"/>
+          </a:fontRef>
+        </p:style>
+      </p:cxnSp>
       <p:sp>
         <p:nvSpPr>
           <p:cNvPr id="9" name="Oval 8">
@@ -3919,8 +3547,8 @@
         </p:nvSpPr>
         <p:spPr>
           <a:xfrm>
-            <a:off x="4770848" y="4104861"/>
-            <a:ext cx="1027040" cy="1027040"/>
+            <a:off x="3311187" y="6657863"/>
+            <a:ext cx="968474" cy="968474"/>
           </a:xfrm>
           <a:prstGeom prst="ellipse">
             <a:avLst/>
@@ -3950,220 +3578,14 @@
           <a:lstStyle/>
           <a:p>
             <a:pPr algn="ctr"/>
-            <a:endParaRPr lang="en-US"/>
+            <a:endParaRPr lang="en-US" sz="3199"/>
           </a:p>
         </p:txBody>
       </p:sp>
     </p:spTree>
     <p:extLst>
       <p:ext uri="{BB962C8B-B14F-4D97-AF65-F5344CB8AC3E}">
-        <p14:creationId xmlns:p14="http://schemas.microsoft.com/office/powerpoint/2010/main" val="414662538"/>
-      </p:ext>
-    </p:extLst>
-  </p:cSld>
-  <p:clrMapOvr>
-    <a:masterClrMapping/>
-  </p:clrMapOvr>
-</p:sld>
-</file>
-
-<file path=ppt/slides/slide4.xml><?xml version="1.0" encoding="utf-8"?>
-<p:sld xmlns:a="http://schemas.openxmlformats.org/drawingml/2006/main" xmlns:r="http://schemas.openxmlformats.org/officeDocument/2006/relationships" xmlns:p="http://schemas.openxmlformats.org/presentationml/2006/main">
-  <p:cSld>
-    <p:spTree>
-      <p:nvGrpSpPr>
-        <p:cNvPr id="1" name=""/>
-        <p:cNvGrpSpPr/>
-        <p:nvPr/>
-      </p:nvGrpSpPr>
-      <p:grpSpPr>
-        <a:xfrm>
-          <a:off x="0" y="0"/>
-          <a:ext cx="0" cy="0"/>
-          <a:chOff x="0" y="0"/>
-          <a:chExt cx="0" cy="0"/>
-        </a:xfrm>
-      </p:grpSpPr>
-      <p:cxnSp>
-        <p:nvCxnSpPr>
-          <p:cNvPr id="3" name="Straight Connector 2">
-            <a:extLst>
-              <a:ext uri="{FF2B5EF4-FFF2-40B4-BE49-F238E27FC236}">
-                <a16:creationId xmlns:a16="http://schemas.microsoft.com/office/drawing/2014/main" id="{4F9DD263-B324-FC4C-96F0-16F3EB950EC8}"/>
-              </a:ext>
-            </a:extLst>
-          </p:cNvPr>
-          <p:cNvCxnSpPr>
-            <a:cxnSpLocks/>
-          </p:cNvCxnSpPr>
-          <p:nvPr/>
-        </p:nvCxnSpPr>
-        <p:spPr>
-          <a:xfrm>
-            <a:off x="1431235" y="4618381"/>
-            <a:ext cx="3853133" cy="0"/>
-          </a:xfrm>
-          <a:prstGeom prst="line">
-            <a:avLst/>
-          </a:prstGeom>
-          <a:ln w="635000"/>
-        </p:spPr>
-        <p:style>
-          <a:lnRef idx="1">
-            <a:schemeClr val="accent1"/>
-          </a:lnRef>
-          <a:fillRef idx="0">
-            <a:schemeClr val="accent1"/>
-          </a:fillRef>
-          <a:effectRef idx="0">
-            <a:schemeClr val="accent1"/>
-          </a:effectRef>
-          <a:fontRef idx="minor">
-            <a:schemeClr val="tx1"/>
-          </a:fontRef>
-        </p:style>
-      </p:cxnSp>
-      <p:cxnSp>
-        <p:nvCxnSpPr>
-          <p:cNvPr id="5" name="Straight Connector 4">
-            <a:extLst>
-              <a:ext uri="{FF2B5EF4-FFF2-40B4-BE49-F238E27FC236}">
-                <a16:creationId xmlns:a16="http://schemas.microsoft.com/office/drawing/2014/main" id="{E3D01841-0740-9B42-B0B5-CE048D001DA4}"/>
-              </a:ext>
-            </a:extLst>
-          </p:cNvPr>
-          <p:cNvCxnSpPr>
-            <a:cxnSpLocks/>
-          </p:cNvCxnSpPr>
-          <p:nvPr/>
-        </p:nvCxnSpPr>
-        <p:spPr>
-          <a:xfrm>
-            <a:off x="5141843" y="4631634"/>
-            <a:ext cx="3833255" cy="0"/>
-          </a:xfrm>
-          <a:prstGeom prst="line">
-            <a:avLst/>
-          </a:prstGeom>
-          <a:ln w="635000"/>
-        </p:spPr>
-        <p:style>
-          <a:lnRef idx="1">
-            <a:schemeClr val="accent1"/>
-          </a:lnRef>
-          <a:fillRef idx="0">
-            <a:schemeClr val="accent1"/>
-          </a:fillRef>
-          <a:effectRef idx="0">
-            <a:schemeClr val="accent1"/>
-          </a:effectRef>
-          <a:fontRef idx="minor">
-            <a:schemeClr val="tx1"/>
-          </a:fontRef>
-        </p:style>
-      </p:cxnSp>
-      <p:sp>
-        <p:nvSpPr>
-          <p:cNvPr id="7" name="Oval 6">
-            <a:extLst>
-              <a:ext uri="{FF2B5EF4-FFF2-40B4-BE49-F238E27FC236}">
-                <a16:creationId xmlns:a16="http://schemas.microsoft.com/office/drawing/2014/main" id="{8B3BB849-564F-FB4C-A931-8AFB5F71517D}"/>
-              </a:ext>
-            </a:extLst>
-          </p:cNvPr>
-          <p:cNvSpPr/>
-          <p:nvPr/>
-        </p:nvSpPr>
-        <p:spPr>
-          <a:xfrm>
-            <a:off x="655170" y="3709795"/>
-            <a:ext cx="1552129" cy="1552129"/>
-          </a:xfrm>
-          <a:prstGeom prst="ellipse">
-            <a:avLst/>
-          </a:prstGeom>
-          <a:ln>
-            <a:noFill/>
-          </a:ln>
-        </p:spPr>
-        <p:style>
-          <a:lnRef idx="2">
-            <a:schemeClr val="accent1">
-              <a:shade val="50000"/>
-            </a:schemeClr>
-          </a:lnRef>
-          <a:fillRef idx="1">
-            <a:schemeClr val="accent1"/>
-          </a:fillRef>
-          <a:effectRef idx="0">
-            <a:schemeClr val="accent1"/>
-          </a:effectRef>
-          <a:fontRef idx="minor">
-            <a:schemeClr val="lt1"/>
-          </a:fontRef>
-        </p:style>
-        <p:txBody>
-          <a:bodyPr rtlCol="0" anchor="ctr"/>
-          <a:lstStyle/>
-          <a:p>
-            <a:pPr algn="ctr"/>
-            <a:endParaRPr lang="en-US"/>
-          </a:p>
-        </p:txBody>
-      </p:sp>
-      <p:sp>
-        <p:nvSpPr>
-          <p:cNvPr id="8" name="Oval 7">
-            <a:extLst>
-              <a:ext uri="{FF2B5EF4-FFF2-40B4-BE49-F238E27FC236}">
-                <a16:creationId xmlns:a16="http://schemas.microsoft.com/office/drawing/2014/main" id="{EF57D6C4-50C9-B54C-A253-F1E2C2206B11}"/>
-              </a:ext>
-            </a:extLst>
-          </p:cNvPr>
-          <p:cNvSpPr/>
-          <p:nvPr/>
-        </p:nvSpPr>
-        <p:spPr>
-          <a:xfrm>
-            <a:off x="4770848" y="4104861"/>
-            <a:ext cx="1027040" cy="1027040"/>
-          </a:xfrm>
-          <a:prstGeom prst="ellipse">
-            <a:avLst/>
-          </a:prstGeom>
-          <a:ln>
-            <a:noFill/>
-          </a:ln>
-        </p:spPr>
-        <p:style>
-          <a:lnRef idx="2">
-            <a:schemeClr val="accent1">
-              <a:shade val="50000"/>
-            </a:schemeClr>
-          </a:lnRef>
-          <a:fillRef idx="1">
-            <a:schemeClr val="accent1"/>
-          </a:fillRef>
-          <a:effectRef idx="0">
-            <a:schemeClr val="accent1"/>
-          </a:effectRef>
-          <a:fontRef idx="minor">
-            <a:schemeClr val="lt1"/>
-          </a:fontRef>
-        </p:style>
-        <p:txBody>
-          <a:bodyPr rtlCol="0" anchor="ctr"/>
-          <a:lstStyle/>
-          <a:p>
-            <a:pPr algn="ctr"/>
-            <a:endParaRPr lang="en-US"/>
-          </a:p>
-        </p:txBody>
-      </p:sp>
-    </p:spTree>
-    <p:extLst>
-      <p:ext uri="{BB962C8B-B14F-4D97-AF65-F5344CB8AC3E}">
-        <p14:creationId xmlns:p14="http://schemas.microsoft.com/office/powerpoint/2010/main" val="1031504346"/>
+        <p14:creationId xmlns:p14="http://schemas.microsoft.com/office/powerpoint/2010/main" val="2572224726"/>
       </p:ext>
     </p:extLst>
   </p:cSld>
@@ -4176,7 +3598,7 @@
 <file path=ppt/theme/theme1.xml><?xml version="1.0" encoding="utf-8"?>
 <a:theme xmlns:a="http://schemas.openxmlformats.org/drawingml/2006/main" name="Office Theme">
   <a:themeElements>
-    <a:clrScheme name="Office">
+    <a:clrScheme name="Office Theme">
       <a:dk1>
         <a:sysClr val="windowText" lastClr="000000"/>
       </a:dk1>
@@ -4214,7 +3636,7 @@
         <a:srgbClr val="954F72"/>
       </a:folHlink>
     </a:clrScheme>
-    <a:fontScheme name="Office">
+    <a:fontScheme name="Office Theme">
       <a:majorFont>
         <a:latin typeface="Calibri Light" panose="020F0302020204030204"/>
         <a:ea typeface=""/>
@@ -4249,23 +3671,6 @@
         <a:font script="Viet" typeface="Times New Roman"/>
         <a:font script="Uigh" typeface="Microsoft Uighur"/>
         <a:font script="Geor" typeface="Sylfaen"/>
-        <a:font script="Armn" typeface="Arial"/>
-        <a:font script="Bugi" typeface="Leelawadee UI"/>
-        <a:font script="Bopo" typeface="Microsoft JhengHei"/>
-        <a:font script="Java" typeface="Javanese Text"/>
-        <a:font script="Lisu" typeface="Segoe UI"/>
-        <a:font script="Mymr" typeface="Myanmar Text"/>
-        <a:font script="Nkoo" typeface="Ebrima"/>
-        <a:font script="Olck" typeface="Nirmala UI"/>
-        <a:font script="Osma" typeface="Ebrima"/>
-        <a:font script="Phag" typeface="Phagspa"/>
-        <a:font script="Syrn" typeface="Estrangelo Edessa"/>
-        <a:font script="Syrj" typeface="Estrangelo Edessa"/>
-        <a:font script="Syre" typeface="Estrangelo Edessa"/>
-        <a:font script="Sora" typeface="Nirmala UI"/>
-        <a:font script="Tale" typeface="Microsoft Tai Le"/>
-        <a:font script="Talu" typeface="Microsoft New Tai Lue"/>
-        <a:font script="Tfng" typeface="Ebrima"/>
       </a:majorFont>
       <a:minorFont>
         <a:latin typeface="Calibri" panose="020F0502020204030204"/>
@@ -4301,26 +3706,9 @@
         <a:font script="Viet" typeface="Arial"/>
         <a:font script="Uigh" typeface="Microsoft Uighur"/>
         <a:font script="Geor" typeface="Sylfaen"/>
-        <a:font script="Armn" typeface="Arial"/>
-        <a:font script="Bugi" typeface="Leelawadee UI"/>
-        <a:font script="Bopo" typeface="Microsoft JhengHei"/>
-        <a:font script="Java" typeface="Javanese Text"/>
-        <a:font script="Lisu" typeface="Segoe UI"/>
-        <a:font script="Mymr" typeface="Myanmar Text"/>
-        <a:font script="Nkoo" typeface="Ebrima"/>
-        <a:font script="Olck" typeface="Nirmala UI"/>
-        <a:font script="Osma" typeface="Ebrima"/>
-        <a:font script="Phag" typeface="Phagspa"/>
-        <a:font script="Syrn" typeface="Estrangelo Edessa"/>
-        <a:font script="Syrj" typeface="Estrangelo Edessa"/>
-        <a:font script="Syre" typeface="Estrangelo Edessa"/>
-        <a:font script="Sora" typeface="Nirmala UI"/>
-        <a:font script="Tale" typeface="Microsoft Tai Le"/>
-        <a:font script="Talu" typeface="Microsoft New Tai Lue"/>
-        <a:font script="Tfng" typeface="Ebrima"/>
       </a:minorFont>
     </a:fontScheme>
-    <a:fmtScheme name="Office">
+    <a:fmtScheme name="Office Theme">
       <a:fillStyleLst>
         <a:solidFill>
           <a:schemeClr val="phClr"/>

</xml_diff>